<commit_message>
Update for 03 Oct 2020
</commit_message>
<xml_diff>
--- a/opening screen.pptx
+++ b/opening screen.pptx
@@ -7,6 +7,10 @@
   <p:sldIdLst>
     <p:sldId id="258" r:id="rId2"/>
     <p:sldId id="257" r:id="rId3"/>
+    <p:sldId id="261" r:id="rId4"/>
+    <p:sldId id="260" r:id="rId5"/>
+    <p:sldId id="259" r:id="rId6"/>
+    <p:sldId id="262" r:id="rId7"/>
   </p:sldIdLst>
   <p:sldSz cx="12192000" cy="6858000"/>
   <p:notesSz cx="6858000" cy="9144000"/>
@@ -105,6 +109,11 @@
       </a:defRPr>
     </a:lvl9pPr>
   </p:defaultTextStyle>
+  <p:extLst>
+    <p:ext uri="{EFAFB233-063F-42B5-8137-9DF3F51BA10A}">
+      <p15:sldGuideLst xmlns:p15="http://schemas.microsoft.com/office/powerpoint/2012/main"/>
+    </p:ext>
+  </p:extLst>
 </p:presentation>
 </file>
 
@@ -444,7 +453,7 @@
             <a:fld id="{5923F103-BC34-4FE4-A40E-EDDEECFDA5D0}" type="datetimeFigureOut">
               <a:rPr lang="en-US" dirty="0"/>
               <a:pPr/>
-              <a:t>9/4/20</a:t>
+              <a:t>9/19/20</a:t>
             </a:fld>
             <a:endParaRPr lang="en-US" dirty="0"/>
           </a:p>
@@ -1531,7 +1540,7 @@
           <a:p>
             <a:fld id="{923A1CC3-2375-41D4-9E03-427CAF2A4C1A}" type="datetimeFigureOut">
               <a:rPr lang="en-US" dirty="0"/>
-              <a:t>9/4/20</a:t>
+              <a:t>9/19/20</a:t>
             </a:fld>
             <a:endParaRPr lang="en-US" dirty="0"/>
           </a:p>
@@ -2510,7 +2519,7 @@
           <a:p>
             <a:fld id="{AFF16868-8199-4C2C-A5B1-63AEE139F88E}" type="datetimeFigureOut">
               <a:rPr lang="en-US" dirty="0"/>
-              <a:t>9/4/20</a:t>
+              <a:t>9/19/20</a:t>
             </a:fld>
             <a:endParaRPr lang="en-US" dirty="0"/>
           </a:p>
@@ -3643,7 +3652,7 @@
           <a:p>
             <a:fld id="{AAD9FF7F-6988-44CC-821B-644E70CD2F73}" type="datetimeFigureOut">
               <a:rPr lang="en-US" dirty="0"/>
-              <a:t>9/4/20</a:t>
+              <a:t>9/19/20</a:t>
             </a:fld>
             <a:endParaRPr lang="en-US" dirty="0"/>
           </a:p>
@@ -4675,7 +4684,7 @@
           <a:p>
             <a:fld id="{5C12C299-16B2-4475-990D-751901EACC14}" type="datetimeFigureOut">
               <a:rPr lang="en-US" dirty="0"/>
-              <a:t>9/4/20</a:t>
+              <a:t>9/19/20</a:t>
             </a:fld>
             <a:endParaRPr lang="en-US" dirty="0"/>
           </a:p>
@@ -5334,7 +5343,7 @@
           <a:p>
             <a:fld id="{9FE86839-B9D8-4651-8783-F325ECE74E65}" type="datetimeFigureOut">
               <a:rPr lang="en-US" dirty="0"/>
-              <a:t>9/4/20</a:t>
+              <a:t>9/19/20</a:t>
             </a:fld>
             <a:endParaRPr lang="en-US" dirty="0"/>
           </a:p>
@@ -6194,7 +6203,7 @@
           <a:p>
             <a:fld id="{FD484F64-32F6-45C5-931F-ADC1662401D0}" type="datetimeFigureOut">
               <a:rPr lang="en-US" dirty="0"/>
-              <a:t>9/4/20</a:t>
+              <a:t>9/19/20</a:t>
             </a:fld>
             <a:endParaRPr lang="en-US" dirty="0"/>
           </a:p>
@@ -6383,7 +6392,7 @@
           <a:p>
             <a:fld id="{53086D93-FCAC-47E0-A2EE-787E62CA814C}" type="datetimeFigureOut">
               <a:rPr lang="en-US" dirty="0"/>
-              <a:t>9/4/20</a:t>
+              <a:t>9/19/20</a:t>
             </a:fld>
             <a:endParaRPr lang="en-US" dirty="0"/>
           </a:p>
@@ -7354,7 +7363,7 @@
           <a:p>
             <a:fld id="{CDA879A6-0FD0-4734-A311-86BFCA472E6E}" type="datetimeFigureOut">
               <a:rPr lang="en-US" dirty="0"/>
-              <a:t>9/4/20</a:t>
+              <a:t>9/19/20</a:t>
             </a:fld>
             <a:endParaRPr lang="en-US" dirty="0"/>
           </a:p>
@@ -7564,7 +7573,7 @@
           <a:p>
             <a:fld id="{19C9CA7B-DFD4-44B5-8C60-D14B8CD1FB59}" type="datetimeFigureOut">
               <a:rPr lang="en-US" dirty="0"/>
-              <a:t>9/4/20</a:t>
+              <a:t>9/19/20</a:t>
             </a:fld>
             <a:endParaRPr lang="en-US" dirty="0"/>
           </a:p>
@@ -8597,7 +8606,7 @@
           <a:p>
             <a:fld id="{F34E6425-0181-43F2-84FC-787E803FD2F8}" type="datetimeFigureOut">
               <a:rPr lang="en-US" dirty="0"/>
-              <a:t>9/4/20</a:t>
+              <a:t>9/19/20</a:t>
             </a:fld>
             <a:endParaRPr lang="en-US" dirty="0"/>
           </a:p>
@@ -8868,7 +8877,7 @@
           <a:p>
             <a:fld id="{3BDB8791-F1B0-41E7-B7FD-A781E65C4266}" type="datetimeFigureOut">
               <a:rPr lang="en-US" dirty="0"/>
-              <a:t>9/4/20</a:t>
+              <a:t>9/19/20</a:t>
             </a:fld>
             <a:endParaRPr lang="en-US" dirty="0"/>
           </a:p>
@@ -9277,7 +9286,7 @@
           <a:p>
             <a:fld id="{5FDD63B2-E120-4ED8-B27B-C685F510A5FE}" type="datetimeFigureOut">
               <a:rPr lang="en-US" dirty="0"/>
-              <a:t>9/4/20</a:t>
+              <a:t>9/19/20</a:t>
             </a:fld>
             <a:endParaRPr lang="en-US" dirty="0"/>
           </a:p>
@@ -9403,7 +9412,7 @@
           <a:p>
             <a:fld id="{7AA18ACC-A947-437B-A130-35BD54FDF1E9}" type="datetimeFigureOut">
               <a:rPr lang="en-US" dirty="0"/>
-              <a:t>9/4/20</a:t>
+              <a:t>9/19/20</a:t>
             </a:fld>
             <a:endParaRPr lang="en-US" dirty="0"/>
           </a:p>
@@ -9497,7 +9506,7 @@
           <a:p>
             <a:fld id="{7C8D7E02-BCB8-4D50-A234-369438C08659}" type="datetimeFigureOut">
               <a:rPr lang="en-US" dirty="0"/>
-              <a:t>9/4/20</a:t>
+              <a:t>9/19/20</a:t>
             </a:fld>
             <a:endParaRPr lang="en-US" dirty="0"/>
           </a:p>
@@ -10577,7 +10586,7 @@
           <a:p>
             <a:fld id="{76E86A4C-8E40-4F87-A4F0-01A0687C5742}" type="datetimeFigureOut">
               <a:rPr lang="en-US" dirty="0"/>
-              <a:t>9/4/20</a:t>
+              <a:t>9/19/20</a:t>
             </a:fld>
             <a:endParaRPr lang="en-US" dirty="0"/>
           </a:p>
@@ -11684,7 +11693,7 @@
           <a:p>
             <a:fld id="{35E72C73-2D91-4E12-BA25-F0AA0C03599B}" type="datetimeFigureOut">
               <a:rPr lang="en-US" dirty="0"/>
-              <a:t>9/4/20</a:t>
+              <a:t>9/19/20</a:t>
             </a:fld>
             <a:endParaRPr lang="en-US" dirty="0"/>
           </a:p>
@@ -12680,7 +12689,7 @@
           <a:p>
             <a:fld id="{2BE451C3-0FF4-47C4-B829-773ADF60F88C}" type="datetimeFigureOut">
               <a:rPr lang="en-US" dirty="0"/>
-              <a:t>9/4/20</a:t>
+              <a:t>9/19/20</a:t>
             </a:fld>
             <a:endParaRPr lang="en-US" dirty="0"/>
           </a:p>
@@ -13336,6 +13345,469 @@
           </a:prstGeom>
         </p:spPr>
       </p:pic>
+      <p:sp>
+        <p:nvSpPr>
+          <p:cNvPr id="5" name="Subtitle 2">
+            <a:extLst>
+              <a:ext uri="{FF2B5EF4-FFF2-40B4-BE49-F238E27FC236}">
+                <a16:creationId xmlns:a16="http://schemas.microsoft.com/office/drawing/2014/main" id="{F1BCB37B-52DC-2147-8BFB-84BD76FD8029}"/>
+              </a:ext>
+            </a:extLst>
+          </p:cNvPr>
+          <p:cNvSpPr txBox="1">
+            <a:spLocks/>
+          </p:cNvSpPr>
+          <p:nvPr/>
+        </p:nvSpPr>
+        <p:spPr bwMode="gray">
+          <a:xfrm>
+            <a:off x="5471632" y="4487676"/>
+            <a:ext cx="2564330" cy="861420"/>
+          </a:xfrm>
+          <a:prstGeom prst="rect">
+            <a:avLst/>
+          </a:prstGeom>
+        </p:spPr>
+        <p:txBody>
+          <a:bodyPr vert="horz" lIns="91440" tIns="45720" rIns="91440" bIns="45720" rtlCol="0" anchor="t">
+            <a:normAutofit/>
+          </a:bodyPr>
+          <a:lstStyle>
+            <a:lvl1pPr marL="0" indent="0" algn="l" defTabSz="457200" rtl="0" eaLnBrk="1" latinLnBrk="0" hangingPunct="1">
+              <a:spcBef>
+                <a:spcPts val="1000"/>
+              </a:spcBef>
+              <a:spcAft>
+                <a:spcPts val="0"/>
+              </a:spcAft>
+              <a:buClr>
+                <a:schemeClr val="accent1"/>
+              </a:buClr>
+              <a:buSzPct val="80000"/>
+              <a:buFont typeface="Wingdings 3" charset="2"/>
+              <a:buNone/>
+              <a:defRPr sz="1800" b="0" i="0" kern="1200" cap="all">
+                <a:solidFill>
+                  <a:schemeClr val="accent1">
+                    <a:lumMod val="60000"/>
+                    <a:lumOff val="40000"/>
+                  </a:schemeClr>
+                </a:solidFill>
+                <a:latin typeface="+mn-lt"/>
+                <a:ea typeface="+mn-ea"/>
+                <a:cs typeface="+mn-cs"/>
+              </a:defRPr>
+            </a:lvl1pPr>
+            <a:lvl2pPr marL="457200" indent="0" algn="ctr" defTabSz="457200" rtl="0" eaLnBrk="1" latinLnBrk="0" hangingPunct="1">
+              <a:spcBef>
+                <a:spcPts val="1000"/>
+              </a:spcBef>
+              <a:spcAft>
+                <a:spcPts val="0"/>
+              </a:spcAft>
+              <a:buClr>
+                <a:schemeClr val="accent1"/>
+              </a:buClr>
+              <a:buSzPct val="80000"/>
+              <a:buFont typeface="Wingdings 3" charset="2"/>
+              <a:buNone/>
+              <a:defRPr sz="1600" b="0" i="0" kern="1200">
+                <a:solidFill>
+                  <a:schemeClr val="tx1">
+                    <a:tint val="75000"/>
+                  </a:schemeClr>
+                </a:solidFill>
+                <a:latin typeface="+mn-lt"/>
+                <a:ea typeface="+mn-ea"/>
+                <a:cs typeface="+mn-cs"/>
+              </a:defRPr>
+            </a:lvl2pPr>
+            <a:lvl3pPr marL="914400" indent="0" algn="ctr" defTabSz="457200" rtl="0" eaLnBrk="1" latinLnBrk="0" hangingPunct="1">
+              <a:spcBef>
+                <a:spcPts val="1000"/>
+              </a:spcBef>
+              <a:spcAft>
+                <a:spcPts val="0"/>
+              </a:spcAft>
+              <a:buClr>
+                <a:schemeClr val="accent1"/>
+              </a:buClr>
+              <a:buSzPct val="80000"/>
+              <a:buFont typeface="Wingdings 3" charset="2"/>
+              <a:buNone/>
+              <a:defRPr sz="1400" b="0" i="0" kern="1200">
+                <a:solidFill>
+                  <a:schemeClr val="tx1">
+                    <a:tint val="75000"/>
+                  </a:schemeClr>
+                </a:solidFill>
+                <a:latin typeface="+mn-lt"/>
+                <a:ea typeface="+mn-ea"/>
+                <a:cs typeface="+mn-cs"/>
+              </a:defRPr>
+            </a:lvl3pPr>
+            <a:lvl4pPr marL="1371600" indent="0" algn="ctr" defTabSz="457200" rtl="0" eaLnBrk="1" latinLnBrk="0" hangingPunct="1">
+              <a:spcBef>
+                <a:spcPts val="1000"/>
+              </a:spcBef>
+              <a:spcAft>
+                <a:spcPts val="0"/>
+              </a:spcAft>
+              <a:buClr>
+                <a:schemeClr val="accent1"/>
+              </a:buClr>
+              <a:buSzPct val="80000"/>
+              <a:buFont typeface="Wingdings 3" charset="2"/>
+              <a:buNone/>
+              <a:defRPr sz="1200" b="0" i="0" kern="1200">
+                <a:solidFill>
+                  <a:schemeClr val="tx1">
+                    <a:tint val="75000"/>
+                  </a:schemeClr>
+                </a:solidFill>
+                <a:latin typeface="+mn-lt"/>
+                <a:ea typeface="+mn-ea"/>
+                <a:cs typeface="+mn-cs"/>
+              </a:defRPr>
+            </a:lvl4pPr>
+            <a:lvl5pPr marL="1828800" indent="0" algn="ctr" defTabSz="457200" rtl="0" eaLnBrk="1" latinLnBrk="0" hangingPunct="1">
+              <a:spcBef>
+                <a:spcPts val="1000"/>
+              </a:spcBef>
+              <a:spcAft>
+                <a:spcPts val="0"/>
+              </a:spcAft>
+              <a:buClr>
+                <a:schemeClr val="accent1"/>
+              </a:buClr>
+              <a:buSzPct val="80000"/>
+              <a:buFont typeface="Wingdings 3" charset="2"/>
+              <a:buNone/>
+              <a:defRPr sz="1200" b="0" i="0" kern="1200">
+                <a:solidFill>
+                  <a:schemeClr val="tx1">
+                    <a:tint val="75000"/>
+                  </a:schemeClr>
+                </a:solidFill>
+                <a:latin typeface="+mn-lt"/>
+                <a:ea typeface="+mn-ea"/>
+                <a:cs typeface="+mn-cs"/>
+              </a:defRPr>
+            </a:lvl5pPr>
+            <a:lvl6pPr marL="2286000" indent="0" algn="ctr" defTabSz="457200" rtl="0" eaLnBrk="1" latinLnBrk="0" hangingPunct="1">
+              <a:spcBef>
+                <a:spcPts val="1000"/>
+              </a:spcBef>
+              <a:spcAft>
+                <a:spcPts val="0"/>
+              </a:spcAft>
+              <a:buClr>
+                <a:schemeClr val="accent1"/>
+              </a:buClr>
+              <a:buSzPct val="80000"/>
+              <a:buFont typeface="Wingdings 3" charset="2"/>
+              <a:buNone/>
+              <a:defRPr sz="1200" b="0" i="0" kern="1200">
+                <a:solidFill>
+                  <a:schemeClr val="tx1">
+                    <a:tint val="75000"/>
+                  </a:schemeClr>
+                </a:solidFill>
+                <a:latin typeface="+mn-lt"/>
+                <a:ea typeface="+mn-ea"/>
+                <a:cs typeface="+mn-cs"/>
+              </a:defRPr>
+            </a:lvl6pPr>
+            <a:lvl7pPr marL="2743200" indent="0" algn="ctr" defTabSz="457200" rtl="0" eaLnBrk="1" latinLnBrk="0" hangingPunct="1">
+              <a:spcBef>
+                <a:spcPts val="1000"/>
+              </a:spcBef>
+              <a:spcAft>
+                <a:spcPts val="0"/>
+              </a:spcAft>
+              <a:buClr>
+                <a:schemeClr val="accent1"/>
+              </a:buClr>
+              <a:buSzPct val="80000"/>
+              <a:buFont typeface="Wingdings 3" charset="2"/>
+              <a:buNone/>
+              <a:defRPr sz="1200" b="0" i="0" kern="1200">
+                <a:solidFill>
+                  <a:schemeClr val="tx1">
+                    <a:tint val="75000"/>
+                  </a:schemeClr>
+                </a:solidFill>
+                <a:latin typeface="+mn-lt"/>
+                <a:ea typeface="+mn-ea"/>
+                <a:cs typeface="+mn-cs"/>
+              </a:defRPr>
+            </a:lvl7pPr>
+            <a:lvl8pPr marL="3200400" indent="0" algn="ctr" defTabSz="457200" rtl="0" eaLnBrk="1" latinLnBrk="0" hangingPunct="1">
+              <a:spcBef>
+                <a:spcPts val="1000"/>
+              </a:spcBef>
+              <a:spcAft>
+                <a:spcPts val="0"/>
+              </a:spcAft>
+              <a:buClr>
+                <a:schemeClr val="accent1"/>
+              </a:buClr>
+              <a:buSzPct val="80000"/>
+              <a:buFont typeface="Wingdings 3" charset="2"/>
+              <a:buNone/>
+              <a:defRPr sz="1200" b="0" i="0" kern="1200">
+                <a:solidFill>
+                  <a:schemeClr val="tx1">
+                    <a:tint val="75000"/>
+                  </a:schemeClr>
+                </a:solidFill>
+                <a:latin typeface="+mn-lt"/>
+                <a:ea typeface="+mn-ea"/>
+                <a:cs typeface="+mn-cs"/>
+              </a:defRPr>
+            </a:lvl8pPr>
+            <a:lvl9pPr marL="3657600" indent="0" algn="ctr" defTabSz="457200" rtl="0" eaLnBrk="1" latinLnBrk="0" hangingPunct="1">
+              <a:spcBef>
+                <a:spcPts val="1000"/>
+              </a:spcBef>
+              <a:spcAft>
+                <a:spcPts val="0"/>
+              </a:spcAft>
+              <a:buClr>
+                <a:schemeClr val="accent1"/>
+              </a:buClr>
+              <a:buSzPct val="80000"/>
+              <a:buFont typeface="Wingdings 3" charset="2"/>
+              <a:buNone/>
+              <a:defRPr sz="1200" b="0" i="0" kern="1200">
+                <a:solidFill>
+                  <a:schemeClr val="tx1">
+                    <a:tint val="75000"/>
+                  </a:schemeClr>
+                </a:solidFill>
+                <a:latin typeface="+mn-lt"/>
+                <a:ea typeface="+mn-ea"/>
+                <a:cs typeface="+mn-cs"/>
+              </a:defRPr>
+            </a:lvl9pPr>
+          </a:lstStyle>
+          <a:p>
+            <a:pPr algn="r"/>
+            <a:r>
+              <a:rPr lang="en-US" b="1" dirty="0"/>
+              <a:t>9 AM – 10 AM</a:t>
+            </a:r>
+          </a:p>
+        </p:txBody>
+      </p:sp>
+      <p:sp>
+        <p:nvSpPr>
+          <p:cNvPr id="7" name="Rectangle 6">
+            <a:extLst>
+              <a:ext uri="{FF2B5EF4-FFF2-40B4-BE49-F238E27FC236}">
+                <a16:creationId xmlns:a16="http://schemas.microsoft.com/office/drawing/2014/main" id="{C5720769-8D34-0C4D-82E9-8D2C0823A4C0}"/>
+              </a:ext>
+            </a:extLst>
+          </p:cNvPr>
+          <p:cNvSpPr/>
+          <p:nvPr/>
+        </p:nvSpPr>
+        <p:spPr>
+          <a:xfrm>
+            <a:off x="6477232" y="4888534"/>
+            <a:ext cx="274320" cy="91440"/>
+          </a:xfrm>
+          <a:prstGeom prst="rect">
+            <a:avLst/>
+          </a:prstGeom>
+          <a:solidFill>
+            <a:srgbClr val="994489"/>
+          </a:solidFill>
+          <a:ln>
+            <a:noFill/>
+          </a:ln>
+        </p:spPr>
+        <p:style>
+          <a:lnRef idx="2">
+            <a:schemeClr val="accent1">
+              <a:shade val="50000"/>
+            </a:schemeClr>
+          </a:lnRef>
+          <a:fillRef idx="1">
+            <a:schemeClr val="accent1"/>
+          </a:fillRef>
+          <a:effectRef idx="0">
+            <a:schemeClr val="accent1"/>
+          </a:effectRef>
+          <a:fontRef idx="minor">
+            <a:schemeClr val="lt1"/>
+          </a:fontRef>
+        </p:style>
+        <p:txBody>
+          <a:bodyPr rtlCol="0" anchor="ctr"/>
+          <a:lstStyle/>
+          <a:p>
+            <a:pPr algn="ctr"/>
+            <a:endParaRPr lang="en-US" dirty="0"/>
+          </a:p>
+        </p:txBody>
+      </p:sp>
+      <p:sp>
+        <p:nvSpPr>
+          <p:cNvPr id="8" name="Rectangle 7">
+            <a:extLst>
+              <a:ext uri="{FF2B5EF4-FFF2-40B4-BE49-F238E27FC236}">
+                <a16:creationId xmlns:a16="http://schemas.microsoft.com/office/drawing/2014/main" id="{CEEA5851-37FD-1B4E-A5A8-4920BDCD6CB8}"/>
+              </a:ext>
+            </a:extLst>
+          </p:cNvPr>
+          <p:cNvSpPr/>
+          <p:nvPr/>
+        </p:nvSpPr>
+        <p:spPr>
+          <a:xfrm>
+            <a:off x="6881602" y="4888534"/>
+            <a:ext cx="274320" cy="91440"/>
+          </a:xfrm>
+          <a:prstGeom prst="rect">
+            <a:avLst/>
+          </a:prstGeom>
+          <a:solidFill>
+            <a:srgbClr val="994489"/>
+          </a:solidFill>
+          <a:ln>
+            <a:noFill/>
+          </a:ln>
+        </p:spPr>
+        <p:style>
+          <a:lnRef idx="2">
+            <a:schemeClr val="accent1">
+              <a:shade val="50000"/>
+            </a:schemeClr>
+          </a:lnRef>
+          <a:fillRef idx="1">
+            <a:schemeClr val="accent1"/>
+          </a:fillRef>
+          <a:effectRef idx="0">
+            <a:schemeClr val="accent1"/>
+          </a:effectRef>
+          <a:fontRef idx="minor">
+            <a:schemeClr val="lt1"/>
+          </a:fontRef>
+        </p:style>
+        <p:txBody>
+          <a:bodyPr rtlCol="0" anchor="ctr"/>
+          <a:lstStyle/>
+          <a:p>
+            <a:pPr algn="ctr"/>
+            <a:endParaRPr lang="en-US" dirty="0"/>
+          </a:p>
+        </p:txBody>
+      </p:sp>
+      <p:sp>
+        <p:nvSpPr>
+          <p:cNvPr id="9" name="Rectangle 8">
+            <a:extLst>
+              <a:ext uri="{FF2B5EF4-FFF2-40B4-BE49-F238E27FC236}">
+                <a16:creationId xmlns:a16="http://schemas.microsoft.com/office/drawing/2014/main" id="{35FA1655-AF59-564B-A7BB-3E11DAEFBF58}"/>
+              </a:ext>
+            </a:extLst>
+          </p:cNvPr>
+          <p:cNvSpPr/>
+          <p:nvPr/>
+        </p:nvSpPr>
+        <p:spPr>
+          <a:xfrm>
+            <a:off x="7285972" y="4888534"/>
+            <a:ext cx="274320" cy="91440"/>
+          </a:xfrm>
+          <a:prstGeom prst="rect">
+            <a:avLst/>
+          </a:prstGeom>
+          <a:solidFill>
+            <a:srgbClr val="994489"/>
+          </a:solidFill>
+          <a:ln>
+            <a:noFill/>
+          </a:ln>
+        </p:spPr>
+        <p:style>
+          <a:lnRef idx="2">
+            <a:schemeClr val="accent1">
+              <a:shade val="50000"/>
+            </a:schemeClr>
+          </a:lnRef>
+          <a:fillRef idx="1">
+            <a:schemeClr val="accent1"/>
+          </a:fillRef>
+          <a:effectRef idx="0">
+            <a:schemeClr val="accent1"/>
+          </a:effectRef>
+          <a:fontRef idx="minor">
+            <a:schemeClr val="lt1"/>
+          </a:fontRef>
+        </p:style>
+        <p:txBody>
+          <a:bodyPr rtlCol="0" anchor="ctr"/>
+          <a:lstStyle/>
+          <a:p>
+            <a:pPr algn="ctr"/>
+            <a:endParaRPr lang="en-US" dirty="0"/>
+          </a:p>
+        </p:txBody>
+      </p:sp>
+      <p:sp>
+        <p:nvSpPr>
+          <p:cNvPr id="10" name="Rectangle 9">
+            <a:extLst>
+              <a:ext uri="{FF2B5EF4-FFF2-40B4-BE49-F238E27FC236}">
+                <a16:creationId xmlns:a16="http://schemas.microsoft.com/office/drawing/2014/main" id="{9B97CC05-2511-6448-84FC-5D0AE48C48B4}"/>
+              </a:ext>
+            </a:extLst>
+          </p:cNvPr>
+          <p:cNvSpPr/>
+          <p:nvPr/>
+        </p:nvSpPr>
+        <p:spPr>
+          <a:xfrm>
+            <a:off x="7690342" y="4888534"/>
+            <a:ext cx="274320" cy="91440"/>
+          </a:xfrm>
+          <a:prstGeom prst="rect">
+            <a:avLst/>
+          </a:prstGeom>
+          <a:solidFill>
+            <a:srgbClr val="994489"/>
+          </a:solidFill>
+          <a:ln>
+            <a:noFill/>
+          </a:ln>
+        </p:spPr>
+        <p:style>
+          <a:lnRef idx="2">
+            <a:schemeClr val="accent1">
+              <a:shade val="50000"/>
+            </a:schemeClr>
+          </a:lnRef>
+          <a:fillRef idx="1">
+            <a:schemeClr val="accent1"/>
+          </a:fillRef>
+          <a:effectRef idx="0">
+            <a:schemeClr val="accent1"/>
+          </a:effectRef>
+          <a:fontRef idx="minor">
+            <a:schemeClr val="lt1"/>
+          </a:fontRef>
+        </p:style>
+        <p:txBody>
+          <a:bodyPr rtlCol="0" anchor="ctr"/>
+          <a:lstStyle/>
+          <a:p>
+            <a:pPr algn="ctr"/>
+            <a:endParaRPr lang="en-US" dirty="0"/>
+          </a:p>
+        </p:txBody>
+      </p:sp>
     </p:spTree>
     <p:extLst>
       <p:ext uri="{BB962C8B-B14F-4D97-AF65-F5344CB8AC3E}">
@@ -13715,10 +14187,217 @@
           <a:p>
             <a:pPr algn="r"/>
             <a:r>
-              <a:rPr lang="en-US" b="1"/>
+              <a:rPr lang="en-US" b="1" dirty="0"/>
               <a:t>9 AM – 10 AM</a:t>
             </a:r>
-            <a:endParaRPr lang="en-US" b="1" dirty="0"/>
+          </a:p>
+        </p:txBody>
+      </p:sp>
+      <p:sp>
+        <p:nvSpPr>
+          <p:cNvPr id="10" name="Rectangle 9">
+            <a:extLst>
+              <a:ext uri="{FF2B5EF4-FFF2-40B4-BE49-F238E27FC236}">
+                <a16:creationId xmlns:a16="http://schemas.microsoft.com/office/drawing/2014/main" id="{34A30568-5128-FC45-BF58-3AA1B8B7F948}"/>
+              </a:ext>
+            </a:extLst>
+          </p:cNvPr>
+          <p:cNvSpPr/>
+          <p:nvPr/>
+        </p:nvSpPr>
+        <p:spPr>
+          <a:xfrm>
+            <a:off x="6477232" y="4888534"/>
+            <a:ext cx="274320" cy="91440"/>
+          </a:xfrm>
+          <a:prstGeom prst="rect">
+            <a:avLst/>
+          </a:prstGeom>
+          <a:solidFill>
+            <a:schemeClr val="accent6"/>
+          </a:solidFill>
+          <a:ln>
+            <a:noFill/>
+          </a:ln>
+        </p:spPr>
+        <p:style>
+          <a:lnRef idx="2">
+            <a:schemeClr val="accent1">
+              <a:shade val="50000"/>
+            </a:schemeClr>
+          </a:lnRef>
+          <a:fillRef idx="1">
+            <a:schemeClr val="accent1"/>
+          </a:fillRef>
+          <a:effectRef idx="0">
+            <a:schemeClr val="accent1"/>
+          </a:effectRef>
+          <a:fontRef idx="minor">
+            <a:schemeClr val="lt1"/>
+          </a:fontRef>
+        </p:style>
+        <p:txBody>
+          <a:bodyPr rtlCol="0" anchor="ctr"/>
+          <a:lstStyle/>
+          <a:p>
+            <a:pPr algn="ctr"/>
+            <a:endParaRPr lang="en-US" dirty="0"/>
+          </a:p>
+        </p:txBody>
+      </p:sp>
+      <p:sp>
+        <p:nvSpPr>
+          <p:cNvPr id="11" name="Rectangle 10">
+            <a:extLst>
+              <a:ext uri="{FF2B5EF4-FFF2-40B4-BE49-F238E27FC236}">
+                <a16:creationId xmlns:a16="http://schemas.microsoft.com/office/drawing/2014/main" id="{57E83E50-61D1-B74E-A657-9F199B1FFCCE}"/>
+              </a:ext>
+            </a:extLst>
+          </p:cNvPr>
+          <p:cNvSpPr/>
+          <p:nvPr/>
+        </p:nvSpPr>
+        <p:spPr>
+          <a:xfrm>
+            <a:off x="6881602" y="4888534"/>
+            <a:ext cx="274320" cy="91440"/>
+          </a:xfrm>
+          <a:prstGeom prst="rect">
+            <a:avLst/>
+          </a:prstGeom>
+          <a:solidFill>
+            <a:srgbClr val="994489"/>
+          </a:solidFill>
+          <a:ln>
+            <a:noFill/>
+          </a:ln>
+        </p:spPr>
+        <p:style>
+          <a:lnRef idx="2">
+            <a:schemeClr val="accent1">
+              <a:shade val="50000"/>
+            </a:schemeClr>
+          </a:lnRef>
+          <a:fillRef idx="1">
+            <a:schemeClr val="accent1"/>
+          </a:fillRef>
+          <a:effectRef idx="0">
+            <a:schemeClr val="accent1"/>
+          </a:effectRef>
+          <a:fontRef idx="minor">
+            <a:schemeClr val="lt1"/>
+          </a:fontRef>
+        </p:style>
+        <p:txBody>
+          <a:bodyPr rtlCol="0" anchor="ctr"/>
+          <a:lstStyle/>
+          <a:p>
+            <a:pPr algn="ctr"/>
+            <a:endParaRPr lang="en-US" dirty="0"/>
+          </a:p>
+        </p:txBody>
+      </p:sp>
+      <p:sp>
+        <p:nvSpPr>
+          <p:cNvPr id="12" name="Rectangle 11">
+            <a:extLst>
+              <a:ext uri="{FF2B5EF4-FFF2-40B4-BE49-F238E27FC236}">
+                <a16:creationId xmlns:a16="http://schemas.microsoft.com/office/drawing/2014/main" id="{D7135E7A-8BD4-504F-882A-732F0495F759}"/>
+              </a:ext>
+            </a:extLst>
+          </p:cNvPr>
+          <p:cNvSpPr/>
+          <p:nvPr/>
+        </p:nvSpPr>
+        <p:spPr>
+          <a:xfrm>
+            <a:off x="7285972" y="4888534"/>
+            <a:ext cx="274320" cy="91440"/>
+          </a:xfrm>
+          <a:prstGeom prst="rect">
+            <a:avLst/>
+          </a:prstGeom>
+          <a:solidFill>
+            <a:srgbClr val="994489"/>
+          </a:solidFill>
+          <a:ln>
+            <a:noFill/>
+          </a:ln>
+        </p:spPr>
+        <p:style>
+          <a:lnRef idx="2">
+            <a:schemeClr val="accent1">
+              <a:shade val="50000"/>
+            </a:schemeClr>
+          </a:lnRef>
+          <a:fillRef idx="1">
+            <a:schemeClr val="accent1"/>
+          </a:fillRef>
+          <a:effectRef idx="0">
+            <a:schemeClr val="accent1"/>
+          </a:effectRef>
+          <a:fontRef idx="minor">
+            <a:schemeClr val="lt1"/>
+          </a:fontRef>
+        </p:style>
+        <p:txBody>
+          <a:bodyPr rtlCol="0" anchor="ctr"/>
+          <a:lstStyle/>
+          <a:p>
+            <a:pPr algn="ctr"/>
+            <a:endParaRPr lang="en-US" dirty="0"/>
+          </a:p>
+        </p:txBody>
+      </p:sp>
+      <p:sp>
+        <p:nvSpPr>
+          <p:cNvPr id="13" name="Rectangle 12">
+            <a:extLst>
+              <a:ext uri="{FF2B5EF4-FFF2-40B4-BE49-F238E27FC236}">
+                <a16:creationId xmlns:a16="http://schemas.microsoft.com/office/drawing/2014/main" id="{0D4E302F-F03D-2843-B39F-B879191F03A0}"/>
+              </a:ext>
+            </a:extLst>
+          </p:cNvPr>
+          <p:cNvSpPr/>
+          <p:nvPr/>
+        </p:nvSpPr>
+        <p:spPr>
+          <a:xfrm>
+            <a:off x="7690342" y="4888534"/>
+            <a:ext cx="274320" cy="91440"/>
+          </a:xfrm>
+          <a:prstGeom prst="rect">
+            <a:avLst/>
+          </a:prstGeom>
+          <a:solidFill>
+            <a:srgbClr val="994489"/>
+          </a:solidFill>
+          <a:ln>
+            <a:noFill/>
+          </a:ln>
+        </p:spPr>
+        <p:style>
+          <a:lnRef idx="2">
+            <a:schemeClr val="accent1">
+              <a:shade val="50000"/>
+            </a:schemeClr>
+          </a:lnRef>
+          <a:fillRef idx="1">
+            <a:schemeClr val="accent1"/>
+          </a:fillRef>
+          <a:effectRef idx="0">
+            <a:schemeClr val="accent1"/>
+          </a:effectRef>
+          <a:fontRef idx="minor">
+            <a:schemeClr val="lt1"/>
+          </a:fontRef>
+        </p:style>
+        <p:txBody>
+          <a:bodyPr rtlCol="0" anchor="ctr"/>
+          <a:lstStyle/>
+          <a:p>
+            <a:pPr algn="ctr"/>
+            <a:endParaRPr lang="en-US" dirty="0"/>
           </a:p>
         </p:txBody>
       </p:sp>
@@ -13726,6 +14405,2351 @@
     <p:extLst>
       <p:ext uri="{BB962C8B-B14F-4D97-AF65-F5344CB8AC3E}">
         <p14:creationId xmlns:p14="http://schemas.microsoft.com/office/powerpoint/2010/main" val="1128340537"/>
+      </p:ext>
+    </p:extLst>
+  </p:cSld>
+  <p:clrMapOvr>
+    <a:masterClrMapping/>
+  </p:clrMapOvr>
+  <p:transition spd="slow" advClick="0" advTm="1000">
+    <p:fade/>
+  </p:transition>
+</p:sld>
+</file>
+
+<file path=ppt/slides/slide3.xml><?xml version="1.0" encoding="utf-8"?>
+<p:sld xmlns:a="http://schemas.openxmlformats.org/drawingml/2006/main" xmlns:r="http://schemas.openxmlformats.org/officeDocument/2006/relationships" xmlns:p="http://schemas.openxmlformats.org/presentationml/2006/main">
+  <p:cSld>
+    <p:spTree>
+      <p:nvGrpSpPr>
+        <p:cNvPr id="1" name=""/>
+        <p:cNvGrpSpPr/>
+        <p:nvPr/>
+      </p:nvGrpSpPr>
+      <p:grpSpPr>
+        <a:xfrm>
+          <a:off x="0" y="0"/>
+          <a:ext cx="0" cy="0"/>
+          <a:chOff x="0" y="0"/>
+          <a:chExt cx="0" cy="0"/>
+        </a:xfrm>
+      </p:grpSpPr>
+      <p:sp>
+        <p:nvSpPr>
+          <p:cNvPr id="2" name="Title 1">
+            <a:extLst>
+              <a:ext uri="{FF2B5EF4-FFF2-40B4-BE49-F238E27FC236}">
+                <a16:creationId xmlns:a16="http://schemas.microsoft.com/office/drawing/2014/main" id="{825DF813-D0E3-4F45-872D-6E96D6FA2A77}"/>
+              </a:ext>
+            </a:extLst>
+          </p:cNvPr>
+          <p:cNvSpPr>
+            <a:spLocks noGrp="1"/>
+          </p:cNvSpPr>
+          <p:nvPr>
+            <p:ph type="ctrTitle"/>
+          </p:nvPr>
+        </p:nvSpPr>
+        <p:spPr>
+          <a:xfrm>
+            <a:off x="1154955" y="1519173"/>
+            <a:ext cx="8825658" cy="2677648"/>
+          </a:xfrm>
+        </p:spPr>
+        <p:txBody>
+          <a:bodyPr/>
+          <a:lstStyle/>
+          <a:p>
+            <a:r>
+              <a:rPr lang="en-US" dirty="0"/>
+              <a:t>Saturday           Club</a:t>
+            </a:r>
+          </a:p>
+        </p:txBody>
+      </p:sp>
+      <p:sp>
+        <p:nvSpPr>
+          <p:cNvPr id="3" name="Subtitle 2">
+            <a:extLst>
+              <a:ext uri="{FF2B5EF4-FFF2-40B4-BE49-F238E27FC236}">
+                <a16:creationId xmlns:a16="http://schemas.microsoft.com/office/drawing/2014/main" id="{067A91CE-B398-6D4B-B5C1-1E644EB021D3}"/>
+              </a:ext>
+            </a:extLst>
+          </p:cNvPr>
+          <p:cNvSpPr>
+            <a:spLocks noGrp="1"/>
+          </p:cNvSpPr>
+          <p:nvPr>
+            <p:ph type="subTitle" idx="1"/>
+          </p:nvPr>
+        </p:nvSpPr>
+        <p:spPr>
+          <a:xfrm>
+            <a:off x="1154955" y="4056966"/>
+            <a:ext cx="6881007" cy="861420"/>
+          </a:xfrm>
+        </p:spPr>
+        <p:txBody>
+          <a:bodyPr/>
+          <a:lstStyle/>
+          <a:p>
+            <a:pPr algn="r"/>
+            <a:r>
+              <a:rPr lang="en-US" dirty="0"/>
+              <a:t>LOYOLA UNIVERSITY CHICAGO</a:t>
+            </a:r>
+          </a:p>
+        </p:txBody>
+      </p:sp>
+      <p:pic>
+        <p:nvPicPr>
+          <p:cNvPr id="6" name="Picture 5" descr="A picture containing drawing, food, light, shirt&#10;&#10;Description automatically generated">
+            <a:extLst>
+              <a:ext uri="{FF2B5EF4-FFF2-40B4-BE49-F238E27FC236}">
+                <a16:creationId xmlns:a16="http://schemas.microsoft.com/office/drawing/2014/main" id="{D8F7DF7E-0156-6044-85B5-D21BEF3C4990}"/>
+              </a:ext>
+            </a:extLst>
+          </p:cNvPr>
+          <p:cNvPicPr>
+            <a:picLocks noChangeAspect="1"/>
+          </p:cNvPicPr>
+          <p:nvPr/>
+        </p:nvPicPr>
+        <p:blipFill>
+          <a:blip r:embed="rId2"/>
+          <a:stretch>
+            <a:fillRect/>
+          </a:stretch>
+        </p:blipFill>
+        <p:spPr>
+          <a:xfrm>
+            <a:off x="3719285" y="1132850"/>
+            <a:ext cx="3175000" cy="3175000"/>
+          </a:xfrm>
+          <a:prstGeom prst="rect">
+            <a:avLst/>
+          </a:prstGeom>
+        </p:spPr>
+      </p:pic>
+      <p:sp>
+        <p:nvSpPr>
+          <p:cNvPr id="5" name="Subtitle 2">
+            <a:extLst>
+              <a:ext uri="{FF2B5EF4-FFF2-40B4-BE49-F238E27FC236}">
+                <a16:creationId xmlns:a16="http://schemas.microsoft.com/office/drawing/2014/main" id="{5A0AB1ED-7DAB-2C4F-BBE5-087ADCCAF858}"/>
+              </a:ext>
+            </a:extLst>
+          </p:cNvPr>
+          <p:cNvSpPr txBox="1">
+            <a:spLocks/>
+          </p:cNvSpPr>
+          <p:nvPr/>
+        </p:nvSpPr>
+        <p:spPr bwMode="gray">
+          <a:xfrm>
+            <a:off x="5471632" y="4487676"/>
+            <a:ext cx="2564330" cy="861420"/>
+          </a:xfrm>
+          <a:prstGeom prst="rect">
+            <a:avLst/>
+          </a:prstGeom>
+        </p:spPr>
+        <p:txBody>
+          <a:bodyPr vert="horz" lIns="91440" tIns="45720" rIns="91440" bIns="45720" rtlCol="0" anchor="t">
+            <a:normAutofit/>
+          </a:bodyPr>
+          <a:lstStyle>
+            <a:lvl1pPr marL="0" indent="0" algn="l" defTabSz="457200" rtl="0" eaLnBrk="1" latinLnBrk="0" hangingPunct="1">
+              <a:spcBef>
+                <a:spcPts val="1000"/>
+              </a:spcBef>
+              <a:spcAft>
+                <a:spcPts val="0"/>
+              </a:spcAft>
+              <a:buClr>
+                <a:schemeClr val="accent1"/>
+              </a:buClr>
+              <a:buSzPct val="80000"/>
+              <a:buFont typeface="Wingdings 3" charset="2"/>
+              <a:buNone/>
+              <a:defRPr sz="1800" b="0" i="0" kern="1200" cap="all">
+                <a:solidFill>
+                  <a:schemeClr val="accent1">
+                    <a:lumMod val="60000"/>
+                    <a:lumOff val="40000"/>
+                  </a:schemeClr>
+                </a:solidFill>
+                <a:latin typeface="+mn-lt"/>
+                <a:ea typeface="+mn-ea"/>
+                <a:cs typeface="+mn-cs"/>
+              </a:defRPr>
+            </a:lvl1pPr>
+            <a:lvl2pPr marL="457200" indent="0" algn="ctr" defTabSz="457200" rtl="0" eaLnBrk="1" latinLnBrk="0" hangingPunct="1">
+              <a:spcBef>
+                <a:spcPts val="1000"/>
+              </a:spcBef>
+              <a:spcAft>
+                <a:spcPts val="0"/>
+              </a:spcAft>
+              <a:buClr>
+                <a:schemeClr val="accent1"/>
+              </a:buClr>
+              <a:buSzPct val="80000"/>
+              <a:buFont typeface="Wingdings 3" charset="2"/>
+              <a:buNone/>
+              <a:defRPr sz="1600" b="0" i="0" kern="1200">
+                <a:solidFill>
+                  <a:schemeClr val="tx1">
+                    <a:tint val="75000"/>
+                  </a:schemeClr>
+                </a:solidFill>
+                <a:latin typeface="+mn-lt"/>
+                <a:ea typeface="+mn-ea"/>
+                <a:cs typeface="+mn-cs"/>
+              </a:defRPr>
+            </a:lvl2pPr>
+            <a:lvl3pPr marL="914400" indent="0" algn="ctr" defTabSz="457200" rtl="0" eaLnBrk="1" latinLnBrk="0" hangingPunct="1">
+              <a:spcBef>
+                <a:spcPts val="1000"/>
+              </a:spcBef>
+              <a:spcAft>
+                <a:spcPts val="0"/>
+              </a:spcAft>
+              <a:buClr>
+                <a:schemeClr val="accent1"/>
+              </a:buClr>
+              <a:buSzPct val="80000"/>
+              <a:buFont typeface="Wingdings 3" charset="2"/>
+              <a:buNone/>
+              <a:defRPr sz="1400" b="0" i="0" kern="1200">
+                <a:solidFill>
+                  <a:schemeClr val="tx1">
+                    <a:tint val="75000"/>
+                  </a:schemeClr>
+                </a:solidFill>
+                <a:latin typeface="+mn-lt"/>
+                <a:ea typeface="+mn-ea"/>
+                <a:cs typeface="+mn-cs"/>
+              </a:defRPr>
+            </a:lvl3pPr>
+            <a:lvl4pPr marL="1371600" indent="0" algn="ctr" defTabSz="457200" rtl="0" eaLnBrk="1" latinLnBrk="0" hangingPunct="1">
+              <a:spcBef>
+                <a:spcPts val="1000"/>
+              </a:spcBef>
+              <a:spcAft>
+                <a:spcPts val="0"/>
+              </a:spcAft>
+              <a:buClr>
+                <a:schemeClr val="accent1"/>
+              </a:buClr>
+              <a:buSzPct val="80000"/>
+              <a:buFont typeface="Wingdings 3" charset="2"/>
+              <a:buNone/>
+              <a:defRPr sz="1200" b="0" i="0" kern="1200">
+                <a:solidFill>
+                  <a:schemeClr val="tx1">
+                    <a:tint val="75000"/>
+                  </a:schemeClr>
+                </a:solidFill>
+                <a:latin typeface="+mn-lt"/>
+                <a:ea typeface="+mn-ea"/>
+                <a:cs typeface="+mn-cs"/>
+              </a:defRPr>
+            </a:lvl4pPr>
+            <a:lvl5pPr marL="1828800" indent="0" algn="ctr" defTabSz="457200" rtl="0" eaLnBrk="1" latinLnBrk="0" hangingPunct="1">
+              <a:spcBef>
+                <a:spcPts val="1000"/>
+              </a:spcBef>
+              <a:spcAft>
+                <a:spcPts val="0"/>
+              </a:spcAft>
+              <a:buClr>
+                <a:schemeClr val="accent1"/>
+              </a:buClr>
+              <a:buSzPct val="80000"/>
+              <a:buFont typeface="Wingdings 3" charset="2"/>
+              <a:buNone/>
+              <a:defRPr sz="1200" b="0" i="0" kern="1200">
+                <a:solidFill>
+                  <a:schemeClr val="tx1">
+                    <a:tint val="75000"/>
+                  </a:schemeClr>
+                </a:solidFill>
+                <a:latin typeface="+mn-lt"/>
+                <a:ea typeface="+mn-ea"/>
+                <a:cs typeface="+mn-cs"/>
+              </a:defRPr>
+            </a:lvl5pPr>
+            <a:lvl6pPr marL="2286000" indent="0" algn="ctr" defTabSz="457200" rtl="0" eaLnBrk="1" latinLnBrk="0" hangingPunct="1">
+              <a:spcBef>
+                <a:spcPts val="1000"/>
+              </a:spcBef>
+              <a:spcAft>
+                <a:spcPts val="0"/>
+              </a:spcAft>
+              <a:buClr>
+                <a:schemeClr val="accent1"/>
+              </a:buClr>
+              <a:buSzPct val="80000"/>
+              <a:buFont typeface="Wingdings 3" charset="2"/>
+              <a:buNone/>
+              <a:defRPr sz="1200" b="0" i="0" kern="1200">
+                <a:solidFill>
+                  <a:schemeClr val="tx1">
+                    <a:tint val="75000"/>
+                  </a:schemeClr>
+                </a:solidFill>
+                <a:latin typeface="+mn-lt"/>
+                <a:ea typeface="+mn-ea"/>
+                <a:cs typeface="+mn-cs"/>
+              </a:defRPr>
+            </a:lvl6pPr>
+            <a:lvl7pPr marL="2743200" indent="0" algn="ctr" defTabSz="457200" rtl="0" eaLnBrk="1" latinLnBrk="0" hangingPunct="1">
+              <a:spcBef>
+                <a:spcPts val="1000"/>
+              </a:spcBef>
+              <a:spcAft>
+                <a:spcPts val="0"/>
+              </a:spcAft>
+              <a:buClr>
+                <a:schemeClr val="accent1"/>
+              </a:buClr>
+              <a:buSzPct val="80000"/>
+              <a:buFont typeface="Wingdings 3" charset="2"/>
+              <a:buNone/>
+              <a:defRPr sz="1200" b="0" i="0" kern="1200">
+                <a:solidFill>
+                  <a:schemeClr val="tx1">
+                    <a:tint val="75000"/>
+                  </a:schemeClr>
+                </a:solidFill>
+                <a:latin typeface="+mn-lt"/>
+                <a:ea typeface="+mn-ea"/>
+                <a:cs typeface="+mn-cs"/>
+              </a:defRPr>
+            </a:lvl7pPr>
+            <a:lvl8pPr marL="3200400" indent="0" algn="ctr" defTabSz="457200" rtl="0" eaLnBrk="1" latinLnBrk="0" hangingPunct="1">
+              <a:spcBef>
+                <a:spcPts val="1000"/>
+              </a:spcBef>
+              <a:spcAft>
+                <a:spcPts val="0"/>
+              </a:spcAft>
+              <a:buClr>
+                <a:schemeClr val="accent1"/>
+              </a:buClr>
+              <a:buSzPct val="80000"/>
+              <a:buFont typeface="Wingdings 3" charset="2"/>
+              <a:buNone/>
+              <a:defRPr sz="1200" b="0" i="0" kern="1200">
+                <a:solidFill>
+                  <a:schemeClr val="tx1">
+                    <a:tint val="75000"/>
+                  </a:schemeClr>
+                </a:solidFill>
+                <a:latin typeface="+mn-lt"/>
+                <a:ea typeface="+mn-ea"/>
+                <a:cs typeface="+mn-cs"/>
+              </a:defRPr>
+            </a:lvl8pPr>
+            <a:lvl9pPr marL="3657600" indent="0" algn="ctr" defTabSz="457200" rtl="0" eaLnBrk="1" latinLnBrk="0" hangingPunct="1">
+              <a:spcBef>
+                <a:spcPts val="1000"/>
+              </a:spcBef>
+              <a:spcAft>
+                <a:spcPts val="0"/>
+              </a:spcAft>
+              <a:buClr>
+                <a:schemeClr val="accent1"/>
+              </a:buClr>
+              <a:buSzPct val="80000"/>
+              <a:buFont typeface="Wingdings 3" charset="2"/>
+              <a:buNone/>
+              <a:defRPr sz="1200" b="0" i="0" kern="1200">
+                <a:solidFill>
+                  <a:schemeClr val="tx1">
+                    <a:tint val="75000"/>
+                  </a:schemeClr>
+                </a:solidFill>
+                <a:latin typeface="+mn-lt"/>
+                <a:ea typeface="+mn-ea"/>
+                <a:cs typeface="+mn-cs"/>
+              </a:defRPr>
+            </a:lvl9pPr>
+          </a:lstStyle>
+          <a:p>
+            <a:pPr algn="r"/>
+            <a:r>
+              <a:rPr lang="en-US" b="1" dirty="0"/>
+              <a:t>9 AM – 10 AM</a:t>
+            </a:r>
+          </a:p>
+        </p:txBody>
+      </p:sp>
+      <p:sp>
+        <p:nvSpPr>
+          <p:cNvPr id="4" name="Rectangle 3">
+            <a:extLst>
+              <a:ext uri="{FF2B5EF4-FFF2-40B4-BE49-F238E27FC236}">
+                <a16:creationId xmlns:a16="http://schemas.microsoft.com/office/drawing/2014/main" id="{75EB4702-8FF9-E548-B316-3921ED0CA012}"/>
+              </a:ext>
+            </a:extLst>
+          </p:cNvPr>
+          <p:cNvSpPr/>
+          <p:nvPr/>
+        </p:nvSpPr>
+        <p:spPr>
+          <a:xfrm>
+            <a:off x="6477232" y="4888534"/>
+            <a:ext cx="274320" cy="91440"/>
+          </a:xfrm>
+          <a:prstGeom prst="rect">
+            <a:avLst/>
+          </a:prstGeom>
+          <a:ln>
+            <a:noFill/>
+          </a:ln>
+        </p:spPr>
+        <p:style>
+          <a:lnRef idx="2">
+            <a:schemeClr val="accent1">
+              <a:shade val="50000"/>
+            </a:schemeClr>
+          </a:lnRef>
+          <a:fillRef idx="1">
+            <a:schemeClr val="accent1"/>
+          </a:fillRef>
+          <a:effectRef idx="0">
+            <a:schemeClr val="accent1"/>
+          </a:effectRef>
+          <a:fontRef idx="minor">
+            <a:schemeClr val="lt1"/>
+          </a:fontRef>
+        </p:style>
+        <p:txBody>
+          <a:bodyPr rtlCol="0" anchor="ctr"/>
+          <a:lstStyle/>
+          <a:p>
+            <a:pPr algn="ctr"/>
+            <a:endParaRPr lang="en-US" dirty="0"/>
+          </a:p>
+        </p:txBody>
+      </p:sp>
+      <p:sp>
+        <p:nvSpPr>
+          <p:cNvPr id="10" name="Rectangle 9">
+            <a:extLst>
+              <a:ext uri="{FF2B5EF4-FFF2-40B4-BE49-F238E27FC236}">
+                <a16:creationId xmlns:a16="http://schemas.microsoft.com/office/drawing/2014/main" id="{34A30568-5128-FC45-BF58-3AA1B8B7F948}"/>
+              </a:ext>
+            </a:extLst>
+          </p:cNvPr>
+          <p:cNvSpPr/>
+          <p:nvPr/>
+        </p:nvSpPr>
+        <p:spPr>
+          <a:xfrm>
+            <a:off x="6881602" y="4888339"/>
+            <a:ext cx="274320" cy="91440"/>
+          </a:xfrm>
+          <a:prstGeom prst="rect">
+            <a:avLst/>
+          </a:prstGeom>
+          <a:solidFill>
+            <a:schemeClr val="accent6"/>
+          </a:solidFill>
+          <a:ln>
+            <a:noFill/>
+          </a:ln>
+        </p:spPr>
+        <p:style>
+          <a:lnRef idx="2">
+            <a:schemeClr val="accent1">
+              <a:shade val="50000"/>
+            </a:schemeClr>
+          </a:lnRef>
+          <a:fillRef idx="1">
+            <a:schemeClr val="accent1"/>
+          </a:fillRef>
+          <a:effectRef idx="0">
+            <a:schemeClr val="accent1"/>
+          </a:effectRef>
+          <a:fontRef idx="minor">
+            <a:schemeClr val="lt1"/>
+          </a:fontRef>
+        </p:style>
+        <p:txBody>
+          <a:bodyPr rtlCol="0" anchor="ctr"/>
+          <a:lstStyle/>
+          <a:p>
+            <a:pPr algn="ctr"/>
+            <a:endParaRPr lang="en-US" dirty="0"/>
+          </a:p>
+        </p:txBody>
+      </p:sp>
+      <p:sp>
+        <p:nvSpPr>
+          <p:cNvPr id="8" name="Rectangle 7">
+            <a:extLst>
+              <a:ext uri="{FF2B5EF4-FFF2-40B4-BE49-F238E27FC236}">
+                <a16:creationId xmlns:a16="http://schemas.microsoft.com/office/drawing/2014/main" id="{BB5E2E54-49A6-D948-A90E-DAD2A0EF6EC6}"/>
+              </a:ext>
+            </a:extLst>
+          </p:cNvPr>
+          <p:cNvSpPr/>
+          <p:nvPr/>
+        </p:nvSpPr>
+        <p:spPr>
+          <a:xfrm>
+            <a:off x="7285972" y="4888534"/>
+            <a:ext cx="274320" cy="91440"/>
+          </a:xfrm>
+          <a:prstGeom prst="rect">
+            <a:avLst/>
+          </a:prstGeom>
+          <a:solidFill>
+            <a:srgbClr val="994489"/>
+          </a:solidFill>
+          <a:ln>
+            <a:noFill/>
+          </a:ln>
+        </p:spPr>
+        <p:style>
+          <a:lnRef idx="2">
+            <a:schemeClr val="accent1">
+              <a:shade val="50000"/>
+            </a:schemeClr>
+          </a:lnRef>
+          <a:fillRef idx="1">
+            <a:schemeClr val="accent1"/>
+          </a:fillRef>
+          <a:effectRef idx="0">
+            <a:schemeClr val="accent1"/>
+          </a:effectRef>
+          <a:fontRef idx="minor">
+            <a:schemeClr val="lt1"/>
+          </a:fontRef>
+        </p:style>
+        <p:txBody>
+          <a:bodyPr rtlCol="0" anchor="ctr"/>
+          <a:lstStyle/>
+          <a:p>
+            <a:pPr algn="ctr"/>
+            <a:endParaRPr lang="en-US" dirty="0"/>
+          </a:p>
+        </p:txBody>
+      </p:sp>
+      <p:sp>
+        <p:nvSpPr>
+          <p:cNvPr id="9" name="Rectangle 8">
+            <a:extLst>
+              <a:ext uri="{FF2B5EF4-FFF2-40B4-BE49-F238E27FC236}">
+                <a16:creationId xmlns:a16="http://schemas.microsoft.com/office/drawing/2014/main" id="{B307CA03-2495-9848-9AEF-801B151130CA}"/>
+              </a:ext>
+            </a:extLst>
+          </p:cNvPr>
+          <p:cNvSpPr/>
+          <p:nvPr/>
+        </p:nvSpPr>
+        <p:spPr>
+          <a:xfrm>
+            <a:off x="7690342" y="4888534"/>
+            <a:ext cx="274320" cy="91440"/>
+          </a:xfrm>
+          <a:prstGeom prst="rect">
+            <a:avLst/>
+          </a:prstGeom>
+          <a:solidFill>
+            <a:srgbClr val="994489"/>
+          </a:solidFill>
+          <a:ln>
+            <a:noFill/>
+          </a:ln>
+        </p:spPr>
+        <p:style>
+          <a:lnRef idx="2">
+            <a:schemeClr val="accent1">
+              <a:shade val="50000"/>
+            </a:schemeClr>
+          </a:lnRef>
+          <a:fillRef idx="1">
+            <a:schemeClr val="accent1"/>
+          </a:fillRef>
+          <a:effectRef idx="0">
+            <a:schemeClr val="accent1"/>
+          </a:effectRef>
+          <a:fontRef idx="minor">
+            <a:schemeClr val="lt1"/>
+          </a:fontRef>
+        </p:style>
+        <p:txBody>
+          <a:bodyPr rtlCol="0" anchor="ctr"/>
+          <a:lstStyle/>
+          <a:p>
+            <a:pPr algn="ctr"/>
+            <a:endParaRPr lang="en-US" dirty="0"/>
+          </a:p>
+        </p:txBody>
+      </p:sp>
+    </p:spTree>
+    <p:extLst>
+      <p:ext uri="{BB962C8B-B14F-4D97-AF65-F5344CB8AC3E}">
+        <p14:creationId xmlns:p14="http://schemas.microsoft.com/office/powerpoint/2010/main" val="2942562916"/>
+      </p:ext>
+    </p:extLst>
+  </p:cSld>
+  <p:clrMapOvr>
+    <a:masterClrMapping/>
+  </p:clrMapOvr>
+  <p:transition spd="slow" advClick="0" advTm="1000">
+    <p:fade/>
+  </p:transition>
+</p:sld>
+</file>
+
+<file path=ppt/slides/slide4.xml><?xml version="1.0" encoding="utf-8"?>
+<p:sld xmlns:a="http://schemas.openxmlformats.org/drawingml/2006/main" xmlns:r="http://schemas.openxmlformats.org/officeDocument/2006/relationships" xmlns:p="http://schemas.openxmlformats.org/presentationml/2006/main">
+  <p:cSld>
+    <p:spTree>
+      <p:nvGrpSpPr>
+        <p:cNvPr id="1" name=""/>
+        <p:cNvGrpSpPr/>
+        <p:nvPr/>
+      </p:nvGrpSpPr>
+      <p:grpSpPr>
+        <a:xfrm>
+          <a:off x="0" y="0"/>
+          <a:ext cx="0" cy="0"/>
+          <a:chOff x="0" y="0"/>
+          <a:chExt cx="0" cy="0"/>
+        </a:xfrm>
+      </p:grpSpPr>
+      <p:sp>
+        <p:nvSpPr>
+          <p:cNvPr id="2" name="Title 1">
+            <a:extLst>
+              <a:ext uri="{FF2B5EF4-FFF2-40B4-BE49-F238E27FC236}">
+                <a16:creationId xmlns:a16="http://schemas.microsoft.com/office/drawing/2014/main" id="{825DF813-D0E3-4F45-872D-6E96D6FA2A77}"/>
+              </a:ext>
+            </a:extLst>
+          </p:cNvPr>
+          <p:cNvSpPr>
+            <a:spLocks noGrp="1"/>
+          </p:cNvSpPr>
+          <p:nvPr>
+            <p:ph type="ctrTitle"/>
+          </p:nvPr>
+        </p:nvSpPr>
+        <p:spPr>
+          <a:xfrm>
+            <a:off x="1154955" y="1519173"/>
+            <a:ext cx="8825658" cy="2677648"/>
+          </a:xfrm>
+        </p:spPr>
+        <p:txBody>
+          <a:bodyPr/>
+          <a:lstStyle/>
+          <a:p>
+            <a:r>
+              <a:rPr lang="en-US" dirty="0"/>
+              <a:t>Saturday           Club</a:t>
+            </a:r>
+          </a:p>
+        </p:txBody>
+      </p:sp>
+      <p:sp>
+        <p:nvSpPr>
+          <p:cNvPr id="3" name="Subtitle 2">
+            <a:extLst>
+              <a:ext uri="{FF2B5EF4-FFF2-40B4-BE49-F238E27FC236}">
+                <a16:creationId xmlns:a16="http://schemas.microsoft.com/office/drawing/2014/main" id="{067A91CE-B398-6D4B-B5C1-1E644EB021D3}"/>
+              </a:ext>
+            </a:extLst>
+          </p:cNvPr>
+          <p:cNvSpPr>
+            <a:spLocks noGrp="1"/>
+          </p:cNvSpPr>
+          <p:nvPr>
+            <p:ph type="subTitle" idx="1"/>
+          </p:nvPr>
+        </p:nvSpPr>
+        <p:spPr>
+          <a:xfrm>
+            <a:off x="1154955" y="4056966"/>
+            <a:ext cx="6881007" cy="861420"/>
+          </a:xfrm>
+        </p:spPr>
+        <p:txBody>
+          <a:bodyPr/>
+          <a:lstStyle/>
+          <a:p>
+            <a:pPr algn="r"/>
+            <a:r>
+              <a:rPr lang="en-US" dirty="0"/>
+              <a:t>LOYOLA UNIVERSITY CHICAGO</a:t>
+            </a:r>
+          </a:p>
+        </p:txBody>
+      </p:sp>
+      <p:pic>
+        <p:nvPicPr>
+          <p:cNvPr id="6" name="Picture 5" descr="A picture containing drawing, food, light, shirt&#10;&#10;Description automatically generated">
+            <a:extLst>
+              <a:ext uri="{FF2B5EF4-FFF2-40B4-BE49-F238E27FC236}">
+                <a16:creationId xmlns:a16="http://schemas.microsoft.com/office/drawing/2014/main" id="{D8F7DF7E-0156-6044-85B5-D21BEF3C4990}"/>
+              </a:ext>
+            </a:extLst>
+          </p:cNvPr>
+          <p:cNvPicPr>
+            <a:picLocks noChangeAspect="1"/>
+          </p:cNvPicPr>
+          <p:nvPr/>
+        </p:nvPicPr>
+        <p:blipFill>
+          <a:blip r:embed="rId2"/>
+          <a:stretch>
+            <a:fillRect/>
+          </a:stretch>
+        </p:blipFill>
+        <p:spPr>
+          <a:xfrm>
+            <a:off x="3719285" y="1132850"/>
+            <a:ext cx="3175000" cy="3175000"/>
+          </a:xfrm>
+          <a:prstGeom prst="rect">
+            <a:avLst/>
+          </a:prstGeom>
+        </p:spPr>
+      </p:pic>
+      <p:sp>
+        <p:nvSpPr>
+          <p:cNvPr id="5" name="Subtitle 2">
+            <a:extLst>
+              <a:ext uri="{FF2B5EF4-FFF2-40B4-BE49-F238E27FC236}">
+                <a16:creationId xmlns:a16="http://schemas.microsoft.com/office/drawing/2014/main" id="{5A0AB1ED-7DAB-2C4F-BBE5-087ADCCAF858}"/>
+              </a:ext>
+            </a:extLst>
+          </p:cNvPr>
+          <p:cNvSpPr txBox="1">
+            <a:spLocks/>
+          </p:cNvSpPr>
+          <p:nvPr/>
+        </p:nvSpPr>
+        <p:spPr bwMode="gray">
+          <a:xfrm>
+            <a:off x="5471632" y="4487676"/>
+            <a:ext cx="2564330" cy="861420"/>
+          </a:xfrm>
+          <a:prstGeom prst="rect">
+            <a:avLst/>
+          </a:prstGeom>
+        </p:spPr>
+        <p:txBody>
+          <a:bodyPr vert="horz" lIns="91440" tIns="45720" rIns="91440" bIns="45720" rtlCol="0" anchor="t">
+            <a:normAutofit/>
+          </a:bodyPr>
+          <a:lstStyle>
+            <a:lvl1pPr marL="0" indent="0" algn="l" defTabSz="457200" rtl="0" eaLnBrk="1" latinLnBrk="0" hangingPunct="1">
+              <a:spcBef>
+                <a:spcPts val="1000"/>
+              </a:spcBef>
+              <a:spcAft>
+                <a:spcPts val="0"/>
+              </a:spcAft>
+              <a:buClr>
+                <a:schemeClr val="accent1"/>
+              </a:buClr>
+              <a:buSzPct val="80000"/>
+              <a:buFont typeface="Wingdings 3" charset="2"/>
+              <a:buNone/>
+              <a:defRPr sz="1800" b="0" i="0" kern="1200" cap="all">
+                <a:solidFill>
+                  <a:schemeClr val="accent1">
+                    <a:lumMod val="60000"/>
+                    <a:lumOff val="40000"/>
+                  </a:schemeClr>
+                </a:solidFill>
+                <a:latin typeface="+mn-lt"/>
+                <a:ea typeface="+mn-ea"/>
+                <a:cs typeface="+mn-cs"/>
+              </a:defRPr>
+            </a:lvl1pPr>
+            <a:lvl2pPr marL="457200" indent="0" algn="ctr" defTabSz="457200" rtl="0" eaLnBrk="1" latinLnBrk="0" hangingPunct="1">
+              <a:spcBef>
+                <a:spcPts val="1000"/>
+              </a:spcBef>
+              <a:spcAft>
+                <a:spcPts val="0"/>
+              </a:spcAft>
+              <a:buClr>
+                <a:schemeClr val="accent1"/>
+              </a:buClr>
+              <a:buSzPct val="80000"/>
+              <a:buFont typeface="Wingdings 3" charset="2"/>
+              <a:buNone/>
+              <a:defRPr sz="1600" b="0" i="0" kern="1200">
+                <a:solidFill>
+                  <a:schemeClr val="tx1">
+                    <a:tint val="75000"/>
+                  </a:schemeClr>
+                </a:solidFill>
+                <a:latin typeface="+mn-lt"/>
+                <a:ea typeface="+mn-ea"/>
+                <a:cs typeface="+mn-cs"/>
+              </a:defRPr>
+            </a:lvl2pPr>
+            <a:lvl3pPr marL="914400" indent="0" algn="ctr" defTabSz="457200" rtl="0" eaLnBrk="1" latinLnBrk="0" hangingPunct="1">
+              <a:spcBef>
+                <a:spcPts val="1000"/>
+              </a:spcBef>
+              <a:spcAft>
+                <a:spcPts val="0"/>
+              </a:spcAft>
+              <a:buClr>
+                <a:schemeClr val="accent1"/>
+              </a:buClr>
+              <a:buSzPct val="80000"/>
+              <a:buFont typeface="Wingdings 3" charset="2"/>
+              <a:buNone/>
+              <a:defRPr sz="1400" b="0" i="0" kern="1200">
+                <a:solidFill>
+                  <a:schemeClr val="tx1">
+                    <a:tint val="75000"/>
+                  </a:schemeClr>
+                </a:solidFill>
+                <a:latin typeface="+mn-lt"/>
+                <a:ea typeface="+mn-ea"/>
+                <a:cs typeface="+mn-cs"/>
+              </a:defRPr>
+            </a:lvl3pPr>
+            <a:lvl4pPr marL="1371600" indent="0" algn="ctr" defTabSz="457200" rtl="0" eaLnBrk="1" latinLnBrk="0" hangingPunct="1">
+              <a:spcBef>
+                <a:spcPts val="1000"/>
+              </a:spcBef>
+              <a:spcAft>
+                <a:spcPts val="0"/>
+              </a:spcAft>
+              <a:buClr>
+                <a:schemeClr val="accent1"/>
+              </a:buClr>
+              <a:buSzPct val="80000"/>
+              <a:buFont typeface="Wingdings 3" charset="2"/>
+              <a:buNone/>
+              <a:defRPr sz="1200" b="0" i="0" kern="1200">
+                <a:solidFill>
+                  <a:schemeClr val="tx1">
+                    <a:tint val="75000"/>
+                  </a:schemeClr>
+                </a:solidFill>
+                <a:latin typeface="+mn-lt"/>
+                <a:ea typeface="+mn-ea"/>
+                <a:cs typeface="+mn-cs"/>
+              </a:defRPr>
+            </a:lvl4pPr>
+            <a:lvl5pPr marL="1828800" indent="0" algn="ctr" defTabSz="457200" rtl="0" eaLnBrk="1" latinLnBrk="0" hangingPunct="1">
+              <a:spcBef>
+                <a:spcPts val="1000"/>
+              </a:spcBef>
+              <a:spcAft>
+                <a:spcPts val="0"/>
+              </a:spcAft>
+              <a:buClr>
+                <a:schemeClr val="accent1"/>
+              </a:buClr>
+              <a:buSzPct val="80000"/>
+              <a:buFont typeface="Wingdings 3" charset="2"/>
+              <a:buNone/>
+              <a:defRPr sz="1200" b="0" i="0" kern="1200">
+                <a:solidFill>
+                  <a:schemeClr val="tx1">
+                    <a:tint val="75000"/>
+                  </a:schemeClr>
+                </a:solidFill>
+                <a:latin typeface="+mn-lt"/>
+                <a:ea typeface="+mn-ea"/>
+                <a:cs typeface="+mn-cs"/>
+              </a:defRPr>
+            </a:lvl5pPr>
+            <a:lvl6pPr marL="2286000" indent="0" algn="ctr" defTabSz="457200" rtl="0" eaLnBrk="1" latinLnBrk="0" hangingPunct="1">
+              <a:spcBef>
+                <a:spcPts val="1000"/>
+              </a:spcBef>
+              <a:spcAft>
+                <a:spcPts val="0"/>
+              </a:spcAft>
+              <a:buClr>
+                <a:schemeClr val="accent1"/>
+              </a:buClr>
+              <a:buSzPct val="80000"/>
+              <a:buFont typeface="Wingdings 3" charset="2"/>
+              <a:buNone/>
+              <a:defRPr sz="1200" b="0" i="0" kern="1200">
+                <a:solidFill>
+                  <a:schemeClr val="tx1">
+                    <a:tint val="75000"/>
+                  </a:schemeClr>
+                </a:solidFill>
+                <a:latin typeface="+mn-lt"/>
+                <a:ea typeface="+mn-ea"/>
+                <a:cs typeface="+mn-cs"/>
+              </a:defRPr>
+            </a:lvl6pPr>
+            <a:lvl7pPr marL="2743200" indent="0" algn="ctr" defTabSz="457200" rtl="0" eaLnBrk="1" latinLnBrk="0" hangingPunct="1">
+              <a:spcBef>
+                <a:spcPts val="1000"/>
+              </a:spcBef>
+              <a:spcAft>
+                <a:spcPts val="0"/>
+              </a:spcAft>
+              <a:buClr>
+                <a:schemeClr val="accent1"/>
+              </a:buClr>
+              <a:buSzPct val="80000"/>
+              <a:buFont typeface="Wingdings 3" charset="2"/>
+              <a:buNone/>
+              <a:defRPr sz="1200" b="0" i="0" kern="1200">
+                <a:solidFill>
+                  <a:schemeClr val="tx1">
+                    <a:tint val="75000"/>
+                  </a:schemeClr>
+                </a:solidFill>
+                <a:latin typeface="+mn-lt"/>
+                <a:ea typeface="+mn-ea"/>
+                <a:cs typeface="+mn-cs"/>
+              </a:defRPr>
+            </a:lvl7pPr>
+            <a:lvl8pPr marL="3200400" indent="0" algn="ctr" defTabSz="457200" rtl="0" eaLnBrk="1" latinLnBrk="0" hangingPunct="1">
+              <a:spcBef>
+                <a:spcPts val="1000"/>
+              </a:spcBef>
+              <a:spcAft>
+                <a:spcPts val="0"/>
+              </a:spcAft>
+              <a:buClr>
+                <a:schemeClr val="accent1"/>
+              </a:buClr>
+              <a:buSzPct val="80000"/>
+              <a:buFont typeface="Wingdings 3" charset="2"/>
+              <a:buNone/>
+              <a:defRPr sz="1200" b="0" i="0" kern="1200">
+                <a:solidFill>
+                  <a:schemeClr val="tx1">
+                    <a:tint val="75000"/>
+                  </a:schemeClr>
+                </a:solidFill>
+                <a:latin typeface="+mn-lt"/>
+                <a:ea typeface="+mn-ea"/>
+                <a:cs typeface="+mn-cs"/>
+              </a:defRPr>
+            </a:lvl8pPr>
+            <a:lvl9pPr marL="3657600" indent="0" algn="ctr" defTabSz="457200" rtl="0" eaLnBrk="1" latinLnBrk="0" hangingPunct="1">
+              <a:spcBef>
+                <a:spcPts val="1000"/>
+              </a:spcBef>
+              <a:spcAft>
+                <a:spcPts val="0"/>
+              </a:spcAft>
+              <a:buClr>
+                <a:schemeClr val="accent1"/>
+              </a:buClr>
+              <a:buSzPct val="80000"/>
+              <a:buFont typeface="Wingdings 3" charset="2"/>
+              <a:buNone/>
+              <a:defRPr sz="1200" b="0" i="0" kern="1200">
+                <a:solidFill>
+                  <a:schemeClr val="tx1">
+                    <a:tint val="75000"/>
+                  </a:schemeClr>
+                </a:solidFill>
+                <a:latin typeface="+mn-lt"/>
+                <a:ea typeface="+mn-ea"/>
+                <a:cs typeface="+mn-cs"/>
+              </a:defRPr>
+            </a:lvl9pPr>
+          </a:lstStyle>
+          <a:p>
+            <a:pPr algn="r"/>
+            <a:r>
+              <a:rPr lang="en-US" b="1" dirty="0"/>
+              <a:t>9 AM – 10 AM</a:t>
+            </a:r>
+          </a:p>
+        </p:txBody>
+      </p:sp>
+      <p:sp>
+        <p:nvSpPr>
+          <p:cNvPr id="4" name="Rectangle 3">
+            <a:extLst>
+              <a:ext uri="{FF2B5EF4-FFF2-40B4-BE49-F238E27FC236}">
+                <a16:creationId xmlns:a16="http://schemas.microsoft.com/office/drawing/2014/main" id="{75EB4702-8FF9-E548-B316-3921ED0CA012}"/>
+              </a:ext>
+            </a:extLst>
+          </p:cNvPr>
+          <p:cNvSpPr/>
+          <p:nvPr/>
+        </p:nvSpPr>
+        <p:spPr>
+          <a:xfrm>
+            <a:off x="6477232" y="4888534"/>
+            <a:ext cx="274320" cy="91440"/>
+          </a:xfrm>
+          <a:prstGeom prst="rect">
+            <a:avLst/>
+          </a:prstGeom>
+          <a:ln>
+            <a:noFill/>
+          </a:ln>
+        </p:spPr>
+        <p:style>
+          <a:lnRef idx="2">
+            <a:schemeClr val="accent1">
+              <a:shade val="50000"/>
+            </a:schemeClr>
+          </a:lnRef>
+          <a:fillRef idx="1">
+            <a:schemeClr val="accent1"/>
+          </a:fillRef>
+          <a:effectRef idx="0">
+            <a:schemeClr val="accent1"/>
+          </a:effectRef>
+          <a:fontRef idx="minor">
+            <a:schemeClr val="lt1"/>
+          </a:fontRef>
+        </p:style>
+        <p:txBody>
+          <a:bodyPr rtlCol="0" anchor="ctr"/>
+          <a:lstStyle/>
+          <a:p>
+            <a:pPr algn="ctr"/>
+            <a:endParaRPr lang="en-US" dirty="0"/>
+          </a:p>
+        </p:txBody>
+      </p:sp>
+      <p:sp>
+        <p:nvSpPr>
+          <p:cNvPr id="8" name="Rectangle 7">
+            <a:extLst>
+              <a:ext uri="{FF2B5EF4-FFF2-40B4-BE49-F238E27FC236}">
+                <a16:creationId xmlns:a16="http://schemas.microsoft.com/office/drawing/2014/main" id="{D4F15DA0-5919-3B45-89B3-DEA88B6DDCD5}"/>
+              </a:ext>
+            </a:extLst>
+          </p:cNvPr>
+          <p:cNvSpPr/>
+          <p:nvPr/>
+        </p:nvSpPr>
+        <p:spPr>
+          <a:xfrm>
+            <a:off x="6881602" y="4888534"/>
+            <a:ext cx="274320" cy="91440"/>
+          </a:xfrm>
+          <a:prstGeom prst="rect">
+            <a:avLst/>
+          </a:prstGeom>
+          <a:ln>
+            <a:noFill/>
+          </a:ln>
+        </p:spPr>
+        <p:style>
+          <a:lnRef idx="2">
+            <a:schemeClr val="accent1">
+              <a:shade val="50000"/>
+            </a:schemeClr>
+          </a:lnRef>
+          <a:fillRef idx="1">
+            <a:schemeClr val="accent1"/>
+          </a:fillRef>
+          <a:effectRef idx="0">
+            <a:schemeClr val="accent1"/>
+          </a:effectRef>
+          <a:fontRef idx="minor">
+            <a:schemeClr val="lt1"/>
+          </a:fontRef>
+        </p:style>
+        <p:txBody>
+          <a:bodyPr rtlCol="0" anchor="ctr"/>
+          <a:lstStyle/>
+          <a:p>
+            <a:pPr algn="ctr"/>
+            <a:endParaRPr lang="en-US" dirty="0"/>
+          </a:p>
+        </p:txBody>
+      </p:sp>
+      <p:sp>
+        <p:nvSpPr>
+          <p:cNvPr id="10" name="Rectangle 9">
+            <a:extLst>
+              <a:ext uri="{FF2B5EF4-FFF2-40B4-BE49-F238E27FC236}">
+                <a16:creationId xmlns:a16="http://schemas.microsoft.com/office/drawing/2014/main" id="{34A30568-5128-FC45-BF58-3AA1B8B7F948}"/>
+              </a:ext>
+            </a:extLst>
+          </p:cNvPr>
+          <p:cNvSpPr/>
+          <p:nvPr/>
+        </p:nvSpPr>
+        <p:spPr>
+          <a:xfrm>
+            <a:off x="7285972" y="4889088"/>
+            <a:ext cx="274320" cy="91440"/>
+          </a:xfrm>
+          <a:prstGeom prst="rect">
+            <a:avLst/>
+          </a:prstGeom>
+          <a:solidFill>
+            <a:schemeClr val="accent6"/>
+          </a:solidFill>
+          <a:ln>
+            <a:noFill/>
+          </a:ln>
+        </p:spPr>
+        <p:style>
+          <a:lnRef idx="2">
+            <a:schemeClr val="accent1">
+              <a:shade val="50000"/>
+            </a:schemeClr>
+          </a:lnRef>
+          <a:fillRef idx="1">
+            <a:schemeClr val="accent1"/>
+          </a:fillRef>
+          <a:effectRef idx="0">
+            <a:schemeClr val="accent1"/>
+          </a:effectRef>
+          <a:fontRef idx="minor">
+            <a:schemeClr val="lt1"/>
+          </a:fontRef>
+        </p:style>
+        <p:txBody>
+          <a:bodyPr rtlCol="0" anchor="ctr"/>
+          <a:lstStyle/>
+          <a:p>
+            <a:pPr algn="ctr"/>
+            <a:endParaRPr lang="en-US" dirty="0"/>
+          </a:p>
+        </p:txBody>
+      </p:sp>
+      <p:sp>
+        <p:nvSpPr>
+          <p:cNvPr id="9" name="Rectangle 8">
+            <a:extLst>
+              <a:ext uri="{FF2B5EF4-FFF2-40B4-BE49-F238E27FC236}">
+                <a16:creationId xmlns:a16="http://schemas.microsoft.com/office/drawing/2014/main" id="{7BB49197-AB46-2143-9D9D-F3BAD823D7BD}"/>
+              </a:ext>
+            </a:extLst>
+          </p:cNvPr>
+          <p:cNvSpPr/>
+          <p:nvPr/>
+        </p:nvSpPr>
+        <p:spPr>
+          <a:xfrm>
+            <a:off x="7690342" y="4888534"/>
+            <a:ext cx="274320" cy="91440"/>
+          </a:xfrm>
+          <a:prstGeom prst="rect">
+            <a:avLst/>
+          </a:prstGeom>
+          <a:solidFill>
+            <a:srgbClr val="994489"/>
+          </a:solidFill>
+          <a:ln>
+            <a:noFill/>
+          </a:ln>
+        </p:spPr>
+        <p:style>
+          <a:lnRef idx="2">
+            <a:schemeClr val="accent1">
+              <a:shade val="50000"/>
+            </a:schemeClr>
+          </a:lnRef>
+          <a:fillRef idx="1">
+            <a:schemeClr val="accent1"/>
+          </a:fillRef>
+          <a:effectRef idx="0">
+            <a:schemeClr val="accent1"/>
+          </a:effectRef>
+          <a:fontRef idx="minor">
+            <a:schemeClr val="lt1"/>
+          </a:fontRef>
+        </p:style>
+        <p:txBody>
+          <a:bodyPr rtlCol="0" anchor="ctr"/>
+          <a:lstStyle/>
+          <a:p>
+            <a:pPr algn="ctr"/>
+            <a:endParaRPr lang="en-US" dirty="0"/>
+          </a:p>
+        </p:txBody>
+      </p:sp>
+    </p:spTree>
+    <p:extLst>
+      <p:ext uri="{BB962C8B-B14F-4D97-AF65-F5344CB8AC3E}">
+        <p14:creationId xmlns:p14="http://schemas.microsoft.com/office/powerpoint/2010/main" val="1104120270"/>
+      </p:ext>
+    </p:extLst>
+  </p:cSld>
+  <p:clrMapOvr>
+    <a:masterClrMapping/>
+  </p:clrMapOvr>
+  <p:transition spd="slow" advClick="0" advTm="1000">
+    <p:fade/>
+  </p:transition>
+</p:sld>
+</file>
+
+<file path=ppt/slides/slide5.xml><?xml version="1.0" encoding="utf-8"?>
+<p:sld xmlns:a="http://schemas.openxmlformats.org/drawingml/2006/main" xmlns:r="http://schemas.openxmlformats.org/officeDocument/2006/relationships" xmlns:p="http://schemas.openxmlformats.org/presentationml/2006/main">
+  <p:cSld>
+    <p:spTree>
+      <p:nvGrpSpPr>
+        <p:cNvPr id="1" name=""/>
+        <p:cNvGrpSpPr/>
+        <p:nvPr/>
+      </p:nvGrpSpPr>
+      <p:grpSpPr>
+        <a:xfrm>
+          <a:off x="0" y="0"/>
+          <a:ext cx="0" cy="0"/>
+          <a:chOff x="0" y="0"/>
+          <a:chExt cx="0" cy="0"/>
+        </a:xfrm>
+      </p:grpSpPr>
+      <p:sp>
+        <p:nvSpPr>
+          <p:cNvPr id="2" name="Title 1">
+            <a:extLst>
+              <a:ext uri="{FF2B5EF4-FFF2-40B4-BE49-F238E27FC236}">
+                <a16:creationId xmlns:a16="http://schemas.microsoft.com/office/drawing/2014/main" id="{825DF813-D0E3-4F45-872D-6E96D6FA2A77}"/>
+              </a:ext>
+            </a:extLst>
+          </p:cNvPr>
+          <p:cNvSpPr>
+            <a:spLocks noGrp="1"/>
+          </p:cNvSpPr>
+          <p:nvPr>
+            <p:ph type="ctrTitle"/>
+          </p:nvPr>
+        </p:nvSpPr>
+        <p:spPr>
+          <a:xfrm>
+            <a:off x="1154955" y="1519173"/>
+            <a:ext cx="8825658" cy="2677648"/>
+          </a:xfrm>
+        </p:spPr>
+        <p:txBody>
+          <a:bodyPr/>
+          <a:lstStyle/>
+          <a:p>
+            <a:r>
+              <a:rPr lang="en-US" dirty="0"/>
+              <a:t>Saturday           Club</a:t>
+            </a:r>
+          </a:p>
+        </p:txBody>
+      </p:sp>
+      <p:sp>
+        <p:nvSpPr>
+          <p:cNvPr id="3" name="Subtitle 2">
+            <a:extLst>
+              <a:ext uri="{FF2B5EF4-FFF2-40B4-BE49-F238E27FC236}">
+                <a16:creationId xmlns:a16="http://schemas.microsoft.com/office/drawing/2014/main" id="{067A91CE-B398-6D4B-B5C1-1E644EB021D3}"/>
+              </a:ext>
+            </a:extLst>
+          </p:cNvPr>
+          <p:cNvSpPr>
+            <a:spLocks noGrp="1"/>
+          </p:cNvSpPr>
+          <p:nvPr>
+            <p:ph type="subTitle" idx="1"/>
+          </p:nvPr>
+        </p:nvSpPr>
+        <p:spPr>
+          <a:xfrm>
+            <a:off x="1154955" y="4056966"/>
+            <a:ext cx="6881007" cy="861420"/>
+          </a:xfrm>
+        </p:spPr>
+        <p:txBody>
+          <a:bodyPr/>
+          <a:lstStyle/>
+          <a:p>
+            <a:pPr algn="r"/>
+            <a:r>
+              <a:rPr lang="en-US" dirty="0"/>
+              <a:t>LOYOLA UNIVERSITY CHICAGO</a:t>
+            </a:r>
+          </a:p>
+        </p:txBody>
+      </p:sp>
+      <p:pic>
+        <p:nvPicPr>
+          <p:cNvPr id="6" name="Picture 5" descr="A picture containing drawing, food, light, shirt&#10;&#10;Description automatically generated">
+            <a:extLst>
+              <a:ext uri="{FF2B5EF4-FFF2-40B4-BE49-F238E27FC236}">
+                <a16:creationId xmlns:a16="http://schemas.microsoft.com/office/drawing/2014/main" id="{D8F7DF7E-0156-6044-85B5-D21BEF3C4990}"/>
+              </a:ext>
+            </a:extLst>
+          </p:cNvPr>
+          <p:cNvPicPr>
+            <a:picLocks noChangeAspect="1"/>
+          </p:cNvPicPr>
+          <p:nvPr/>
+        </p:nvPicPr>
+        <p:blipFill>
+          <a:blip r:embed="rId2"/>
+          <a:stretch>
+            <a:fillRect/>
+          </a:stretch>
+        </p:blipFill>
+        <p:spPr>
+          <a:xfrm>
+            <a:off x="3719285" y="1132850"/>
+            <a:ext cx="3175000" cy="3175000"/>
+          </a:xfrm>
+          <a:prstGeom prst="rect">
+            <a:avLst/>
+          </a:prstGeom>
+        </p:spPr>
+      </p:pic>
+      <p:sp>
+        <p:nvSpPr>
+          <p:cNvPr id="5" name="Subtitle 2">
+            <a:extLst>
+              <a:ext uri="{FF2B5EF4-FFF2-40B4-BE49-F238E27FC236}">
+                <a16:creationId xmlns:a16="http://schemas.microsoft.com/office/drawing/2014/main" id="{5A0AB1ED-7DAB-2C4F-BBE5-087ADCCAF858}"/>
+              </a:ext>
+            </a:extLst>
+          </p:cNvPr>
+          <p:cNvSpPr txBox="1">
+            <a:spLocks/>
+          </p:cNvSpPr>
+          <p:nvPr/>
+        </p:nvSpPr>
+        <p:spPr bwMode="gray">
+          <a:xfrm>
+            <a:off x="5471632" y="4487676"/>
+            <a:ext cx="2564330" cy="861420"/>
+          </a:xfrm>
+          <a:prstGeom prst="rect">
+            <a:avLst/>
+          </a:prstGeom>
+        </p:spPr>
+        <p:txBody>
+          <a:bodyPr vert="horz" lIns="91440" tIns="45720" rIns="91440" bIns="45720" rtlCol="0" anchor="t">
+            <a:normAutofit/>
+          </a:bodyPr>
+          <a:lstStyle>
+            <a:lvl1pPr marL="0" indent="0" algn="l" defTabSz="457200" rtl="0" eaLnBrk="1" latinLnBrk="0" hangingPunct="1">
+              <a:spcBef>
+                <a:spcPts val="1000"/>
+              </a:spcBef>
+              <a:spcAft>
+                <a:spcPts val="0"/>
+              </a:spcAft>
+              <a:buClr>
+                <a:schemeClr val="accent1"/>
+              </a:buClr>
+              <a:buSzPct val="80000"/>
+              <a:buFont typeface="Wingdings 3" charset="2"/>
+              <a:buNone/>
+              <a:defRPr sz="1800" b="0" i="0" kern="1200" cap="all">
+                <a:solidFill>
+                  <a:schemeClr val="accent1">
+                    <a:lumMod val="60000"/>
+                    <a:lumOff val="40000"/>
+                  </a:schemeClr>
+                </a:solidFill>
+                <a:latin typeface="+mn-lt"/>
+                <a:ea typeface="+mn-ea"/>
+                <a:cs typeface="+mn-cs"/>
+              </a:defRPr>
+            </a:lvl1pPr>
+            <a:lvl2pPr marL="457200" indent="0" algn="ctr" defTabSz="457200" rtl="0" eaLnBrk="1" latinLnBrk="0" hangingPunct="1">
+              <a:spcBef>
+                <a:spcPts val="1000"/>
+              </a:spcBef>
+              <a:spcAft>
+                <a:spcPts val="0"/>
+              </a:spcAft>
+              <a:buClr>
+                <a:schemeClr val="accent1"/>
+              </a:buClr>
+              <a:buSzPct val="80000"/>
+              <a:buFont typeface="Wingdings 3" charset="2"/>
+              <a:buNone/>
+              <a:defRPr sz="1600" b="0" i="0" kern="1200">
+                <a:solidFill>
+                  <a:schemeClr val="tx1">
+                    <a:tint val="75000"/>
+                  </a:schemeClr>
+                </a:solidFill>
+                <a:latin typeface="+mn-lt"/>
+                <a:ea typeface="+mn-ea"/>
+                <a:cs typeface="+mn-cs"/>
+              </a:defRPr>
+            </a:lvl2pPr>
+            <a:lvl3pPr marL="914400" indent="0" algn="ctr" defTabSz="457200" rtl="0" eaLnBrk="1" latinLnBrk="0" hangingPunct="1">
+              <a:spcBef>
+                <a:spcPts val="1000"/>
+              </a:spcBef>
+              <a:spcAft>
+                <a:spcPts val="0"/>
+              </a:spcAft>
+              <a:buClr>
+                <a:schemeClr val="accent1"/>
+              </a:buClr>
+              <a:buSzPct val="80000"/>
+              <a:buFont typeface="Wingdings 3" charset="2"/>
+              <a:buNone/>
+              <a:defRPr sz="1400" b="0" i="0" kern="1200">
+                <a:solidFill>
+                  <a:schemeClr val="tx1">
+                    <a:tint val="75000"/>
+                  </a:schemeClr>
+                </a:solidFill>
+                <a:latin typeface="+mn-lt"/>
+                <a:ea typeface="+mn-ea"/>
+                <a:cs typeface="+mn-cs"/>
+              </a:defRPr>
+            </a:lvl3pPr>
+            <a:lvl4pPr marL="1371600" indent="0" algn="ctr" defTabSz="457200" rtl="0" eaLnBrk="1" latinLnBrk="0" hangingPunct="1">
+              <a:spcBef>
+                <a:spcPts val="1000"/>
+              </a:spcBef>
+              <a:spcAft>
+                <a:spcPts val="0"/>
+              </a:spcAft>
+              <a:buClr>
+                <a:schemeClr val="accent1"/>
+              </a:buClr>
+              <a:buSzPct val="80000"/>
+              <a:buFont typeface="Wingdings 3" charset="2"/>
+              <a:buNone/>
+              <a:defRPr sz="1200" b="0" i="0" kern="1200">
+                <a:solidFill>
+                  <a:schemeClr val="tx1">
+                    <a:tint val="75000"/>
+                  </a:schemeClr>
+                </a:solidFill>
+                <a:latin typeface="+mn-lt"/>
+                <a:ea typeface="+mn-ea"/>
+                <a:cs typeface="+mn-cs"/>
+              </a:defRPr>
+            </a:lvl4pPr>
+            <a:lvl5pPr marL="1828800" indent="0" algn="ctr" defTabSz="457200" rtl="0" eaLnBrk="1" latinLnBrk="0" hangingPunct="1">
+              <a:spcBef>
+                <a:spcPts val="1000"/>
+              </a:spcBef>
+              <a:spcAft>
+                <a:spcPts val="0"/>
+              </a:spcAft>
+              <a:buClr>
+                <a:schemeClr val="accent1"/>
+              </a:buClr>
+              <a:buSzPct val="80000"/>
+              <a:buFont typeface="Wingdings 3" charset="2"/>
+              <a:buNone/>
+              <a:defRPr sz="1200" b="0" i="0" kern="1200">
+                <a:solidFill>
+                  <a:schemeClr val="tx1">
+                    <a:tint val="75000"/>
+                  </a:schemeClr>
+                </a:solidFill>
+                <a:latin typeface="+mn-lt"/>
+                <a:ea typeface="+mn-ea"/>
+                <a:cs typeface="+mn-cs"/>
+              </a:defRPr>
+            </a:lvl5pPr>
+            <a:lvl6pPr marL="2286000" indent="0" algn="ctr" defTabSz="457200" rtl="0" eaLnBrk="1" latinLnBrk="0" hangingPunct="1">
+              <a:spcBef>
+                <a:spcPts val="1000"/>
+              </a:spcBef>
+              <a:spcAft>
+                <a:spcPts val="0"/>
+              </a:spcAft>
+              <a:buClr>
+                <a:schemeClr val="accent1"/>
+              </a:buClr>
+              <a:buSzPct val="80000"/>
+              <a:buFont typeface="Wingdings 3" charset="2"/>
+              <a:buNone/>
+              <a:defRPr sz="1200" b="0" i="0" kern="1200">
+                <a:solidFill>
+                  <a:schemeClr val="tx1">
+                    <a:tint val="75000"/>
+                  </a:schemeClr>
+                </a:solidFill>
+                <a:latin typeface="+mn-lt"/>
+                <a:ea typeface="+mn-ea"/>
+                <a:cs typeface="+mn-cs"/>
+              </a:defRPr>
+            </a:lvl6pPr>
+            <a:lvl7pPr marL="2743200" indent="0" algn="ctr" defTabSz="457200" rtl="0" eaLnBrk="1" latinLnBrk="0" hangingPunct="1">
+              <a:spcBef>
+                <a:spcPts val="1000"/>
+              </a:spcBef>
+              <a:spcAft>
+                <a:spcPts val="0"/>
+              </a:spcAft>
+              <a:buClr>
+                <a:schemeClr val="accent1"/>
+              </a:buClr>
+              <a:buSzPct val="80000"/>
+              <a:buFont typeface="Wingdings 3" charset="2"/>
+              <a:buNone/>
+              <a:defRPr sz="1200" b="0" i="0" kern="1200">
+                <a:solidFill>
+                  <a:schemeClr val="tx1">
+                    <a:tint val="75000"/>
+                  </a:schemeClr>
+                </a:solidFill>
+                <a:latin typeface="+mn-lt"/>
+                <a:ea typeface="+mn-ea"/>
+                <a:cs typeface="+mn-cs"/>
+              </a:defRPr>
+            </a:lvl7pPr>
+            <a:lvl8pPr marL="3200400" indent="0" algn="ctr" defTabSz="457200" rtl="0" eaLnBrk="1" latinLnBrk="0" hangingPunct="1">
+              <a:spcBef>
+                <a:spcPts val="1000"/>
+              </a:spcBef>
+              <a:spcAft>
+                <a:spcPts val="0"/>
+              </a:spcAft>
+              <a:buClr>
+                <a:schemeClr val="accent1"/>
+              </a:buClr>
+              <a:buSzPct val="80000"/>
+              <a:buFont typeface="Wingdings 3" charset="2"/>
+              <a:buNone/>
+              <a:defRPr sz="1200" b="0" i="0" kern="1200">
+                <a:solidFill>
+                  <a:schemeClr val="tx1">
+                    <a:tint val="75000"/>
+                  </a:schemeClr>
+                </a:solidFill>
+                <a:latin typeface="+mn-lt"/>
+                <a:ea typeface="+mn-ea"/>
+                <a:cs typeface="+mn-cs"/>
+              </a:defRPr>
+            </a:lvl8pPr>
+            <a:lvl9pPr marL="3657600" indent="0" algn="ctr" defTabSz="457200" rtl="0" eaLnBrk="1" latinLnBrk="0" hangingPunct="1">
+              <a:spcBef>
+                <a:spcPts val="1000"/>
+              </a:spcBef>
+              <a:spcAft>
+                <a:spcPts val="0"/>
+              </a:spcAft>
+              <a:buClr>
+                <a:schemeClr val="accent1"/>
+              </a:buClr>
+              <a:buSzPct val="80000"/>
+              <a:buFont typeface="Wingdings 3" charset="2"/>
+              <a:buNone/>
+              <a:defRPr sz="1200" b="0" i="0" kern="1200">
+                <a:solidFill>
+                  <a:schemeClr val="tx1">
+                    <a:tint val="75000"/>
+                  </a:schemeClr>
+                </a:solidFill>
+                <a:latin typeface="+mn-lt"/>
+                <a:ea typeface="+mn-ea"/>
+                <a:cs typeface="+mn-cs"/>
+              </a:defRPr>
+            </a:lvl9pPr>
+          </a:lstStyle>
+          <a:p>
+            <a:pPr algn="r"/>
+            <a:r>
+              <a:rPr lang="en-US" b="1" dirty="0"/>
+              <a:t>9 AM – 10 AM</a:t>
+            </a:r>
+          </a:p>
+        </p:txBody>
+      </p:sp>
+      <p:sp>
+        <p:nvSpPr>
+          <p:cNvPr id="4" name="Rectangle 3">
+            <a:extLst>
+              <a:ext uri="{FF2B5EF4-FFF2-40B4-BE49-F238E27FC236}">
+                <a16:creationId xmlns:a16="http://schemas.microsoft.com/office/drawing/2014/main" id="{75EB4702-8FF9-E548-B316-3921ED0CA012}"/>
+              </a:ext>
+            </a:extLst>
+          </p:cNvPr>
+          <p:cNvSpPr/>
+          <p:nvPr/>
+        </p:nvSpPr>
+        <p:spPr>
+          <a:xfrm>
+            <a:off x="6477232" y="4888534"/>
+            <a:ext cx="274320" cy="91440"/>
+          </a:xfrm>
+          <a:prstGeom prst="rect">
+            <a:avLst/>
+          </a:prstGeom>
+          <a:ln>
+            <a:noFill/>
+          </a:ln>
+        </p:spPr>
+        <p:style>
+          <a:lnRef idx="2">
+            <a:schemeClr val="accent1">
+              <a:shade val="50000"/>
+            </a:schemeClr>
+          </a:lnRef>
+          <a:fillRef idx="1">
+            <a:schemeClr val="accent1"/>
+          </a:fillRef>
+          <a:effectRef idx="0">
+            <a:schemeClr val="accent1"/>
+          </a:effectRef>
+          <a:fontRef idx="minor">
+            <a:schemeClr val="lt1"/>
+          </a:fontRef>
+        </p:style>
+        <p:txBody>
+          <a:bodyPr rtlCol="0" anchor="ctr"/>
+          <a:lstStyle/>
+          <a:p>
+            <a:pPr algn="ctr"/>
+            <a:endParaRPr lang="en-US" dirty="0"/>
+          </a:p>
+        </p:txBody>
+      </p:sp>
+      <p:sp>
+        <p:nvSpPr>
+          <p:cNvPr id="8" name="Rectangle 7">
+            <a:extLst>
+              <a:ext uri="{FF2B5EF4-FFF2-40B4-BE49-F238E27FC236}">
+                <a16:creationId xmlns:a16="http://schemas.microsoft.com/office/drawing/2014/main" id="{D4F15DA0-5919-3B45-89B3-DEA88B6DDCD5}"/>
+              </a:ext>
+            </a:extLst>
+          </p:cNvPr>
+          <p:cNvSpPr/>
+          <p:nvPr/>
+        </p:nvSpPr>
+        <p:spPr>
+          <a:xfrm>
+            <a:off x="6881602" y="4888534"/>
+            <a:ext cx="274320" cy="91440"/>
+          </a:xfrm>
+          <a:prstGeom prst="rect">
+            <a:avLst/>
+          </a:prstGeom>
+          <a:ln>
+            <a:noFill/>
+          </a:ln>
+        </p:spPr>
+        <p:style>
+          <a:lnRef idx="2">
+            <a:schemeClr val="accent1">
+              <a:shade val="50000"/>
+            </a:schemeClr>
+          </a:lnRef>
+          <a:fillRef idx="1">
+            <a:schemeClr val="accent1"/>
+          </a:fillRef>
+          <a:effectRef idx="0">
+            <a:schemeClr val="accent1"/>
+          </a:effectRef>
+          <a:fontRef idx="minor">
+            <a:schemeClr val="lt1"/>
+          </a:fontRef>
+        </p:style>
+        <p:txBody>
+          <a:bodyPr rtlCol="0" anchor="ctr"/>
+          <a:lstStyle/>
+          <a:p>
+            <a:pPr algn="ctr"/>
+            <a:endParaRPr lang="en-US" dirty="0"/>
+          </a:p>
+        </p:txBody>
+      </p:sp>
+      <p:sp>
+        <p:nvSpPr>
+          <p:cNvPr id="9" name="Rectangle 8">
+            <a:extLst>
+              <a:ext uri="{FF2B5EF4-FFF2-40B4-BE49-F238E27FC236}">
+                <a16:creationId xmlns:a16="http://schemas.microsoft.com/office/drawing/2014/main" id="{6C0FB79F-EACC-7B4E-8694-75D978BD5718}"/>
+              </a:ext>
+            </a:extLst>
+          </p:cNvPr>
+          <p:cNvSpPr/>
+          <p:nvPr/>
+        </p:nvSpPr>
+        <p:spPr>
+          <a:xfrm>
+            <a:off x="7285972" y="4888534"/>
+            <a:ext cx="274320" cy="91440"/>
+          </a:xfrm>
+          <a:prstGeom prst="rect">
+            <a:avLst/>
+          </a:prstGeom>
+          <a:ln>
+            <a:noFill/>
+          </a:ln>
+        </p:spPr>
+        <p:style>
+          <a:lnRef idx="2">
+            <a:schemeClr val="accent1">
+              <a:shade val="50000"/>
+            </a:schemeClr>
+          </a:lnRef>
+          <a:fillRef idx="1">
+            <a:schemeClr val="accent1"/>
+          </a:fillRef>
+          <a:effectRef idx="0">
+            <a:schemeClr val="accent1"/>
+          </a:effectRef>
+          <a:fontRef idx="minor">
+            <a:schemeClr val="lt1"/>
+          </a:fontRef>
+        </p:style>
+        <p:txBody>
+          <a:bodyPr rtlCol="0" anchor="ctr"/>
+          <a:lstStyle/>
+          <a:p>
+            <a:pPr algn="ctr"/>
+            <a:endParaRPr lang="en-US" dirty="0"/>
+          </a:p>
+        </p:txBody>
+      </p:sp>
+      <p:sp>
+        <p:nvSpPr>
+          <p:cNvPr id="10" name="Rectangle 9">
+            <a:extLst>
+              <a:ext uri="{FF2B5EF4-FFF2-40B4-BE49-F238E27FC236}">
+                <a16:creationId xmlns:a16="http://schemas.microsoft.com/office/drawing/2014/main" id="{34A30568-5128-FC45-BF58-3AA1B8B7F948}"/>
+              </a:ext>
+            </a:extLst>
+          </p:cNvPr>
+          <p:cNvSpPr/>
+          <p:nvPr/>
+        </p:nvSpPr>
+        <p:spPr>
+          <a:xfrm>
+            <a:off x="7690342" y="4888534"/>
+            <a:ext cx="274320" cy="91440"/>
+          </a:xfrm>
+          <a:prstGeom prst="rect">
+            <a:avLst/>
+          </a:prstGeom>
+          <a:solidFill>
+            <a:schemeClr val="accent6"/>
+          </a:solidFill>
+          <a:ln>
+            <a:noFill/>
+          </a:ln>
+        </p:spPr>
+        <p:style>
+          <a:lnRef idx="2">
+            <a:schemeClr val="accent1">
+              <a:shade val="50000"/>
+            </a:schemeClr>
+          </a:lnRef>
+          <a:fillRef idx="1">
+            <a:schemeClr val="accent1"/>
+          </a:fillRef>
+          <a:effectRef idx="0">
+            <a:schemeClr val="accent1"/>
+          </a:effectRef>
+          <a:fontRef idx="minor">
+            <a:schemeClr val="lt1"/>
+          </a:fontRef>
+        </p:style>
+        <p:txBody>
+          <a:bodyPr rtlCol="0" anchor="ctr"/>
+          <a:lstStyle/>
+          <a:p>
+            <a:pPr algn="ctr"/>
+            <a:endParaRPr lang="en-US" dirty="0"/>
+          </a:p>
+        </p:txBody>
+      </p:sp>
+    </p:spTree>
+    <p:extLst>
+      <p:ext uri="{BB962C8B-B14F-4D97-AF65-F5344CB8AC3E}">
+        <p14:creationId xmlns:p14="http://schemas.microsoft.com/office/powerpoint/2010/main" val="3194885941"/>
+      </p:ext>
+    </p:extLst>
+  </p:cSld>
+  <p:clrMapOvr>
+    <a:masterClrMapping/>
+  </p:clrMapOvr>
+  <p:transition spd="slow" advClick="0" advTm="1000">
+    <p:fade/>
+  </p:transition>
+</p:sld>
+</file>
+
+<file path=ppt/slides/slide6.xml><?xml version="1.0" encoding="utf-8"?>
+<p:sld xmlns:a="http://schemas.openxmlformats.org/drawingml/2006/main" xmlns:r="http://schemas.openxmlformats.org/officeDocument/2006/relationships" xmlns:p="http://schemas.openxmlformats.org/presentationml/2006/main">
+  <p:cSld>
+    <p:spTree>
+      <p:nvGrpSpPr>
+        <p:cNvPr id="1" name=""/>
+        <p:cNvGrpSpPr/>
+        <p:nvPr/>
+      </p:nvGrpSpPr>
+      <p:grpSpPr>
+        <a:xfrm>
+          <a:off x="0" y="0"/>
+          <a:ext cx="0" cy="0"/>
+          <a:chOff x="0" y="0"/>
+          <a:chExt cx="0" cy="0"/>
+        </a:xfrm>
+      </p:grpSpPr>
+      <p:sp>
+        <p:nvSpPr>
+          <p:cNvPr id="2" name="Title 1">
+            <a:extLst>
+              <a:ext uri="{FF2B5EF4-FFF2-40B4-BE49-F238E27FC236}">
+                <a16:creationId xmlns:a16="http://schemas.microsoft.com/office/drawing/2014/main" id="{825DF813-D0E3-4F45-872D-6E96D6FA2A77}"/>
+              </a:ext>
+            </a:extLst>
+          </p:cNvPr>
+          <p:cNvSpPr>
+            <a:spLocks noGrp="1"/>
+          </p:cNvSpPr>
+          <p:nvPr>
+            <p:ph type="ctrTitle"/>
+          </p:nvPr>
+        </p:nvSpPr>
+        <p:spPr>
+          <a:xfrm>
+            <a:off x="1154955" y="1519173"/>
+            <a:ext cx="8825658" cy="2677648"/>
+          </a:xfrm>
+        </p:spPr>
+        <p:txBody>
+          <a:bodyPr/>
+          <a:lstStyle/>
+          <a:p>
+            <a:r>
+              <a:rPr lang="en-US" dirty="0"/>
+              <a:t>Saturday           Club</a:t>
+            </a:r>
+          </a:p>
+        </p:txBody>
+      </p:sp>
+      <p:sp>
+        <p:nvSpPr>
+          <p:cNvPr id="3" name="Subtitle 2">
+            <a:extLst>
+              <a:ext uri="{FF2B5EF4-FFF2-40B4-BE49-F238E27FC236}">
+                <a16:creationId xmlns:a16="http://schemas.microsoft.com/office/drawing/2014/main" id="{067A91CE-B398-6D4B-B5C1-1E644EB021D3}"/>
+              </a:ext>
+            </a:extLst>
+          </p:cNvPr>
+          <p:cNvSpPr>
+            <a:spLocks noGrp="1"/>
+          </p:cNvSpPr>
+          <p:nvPr>
+            <p:ph type="subTitle" idx="1"/>
+          </p:nvPr>
+        </p:nvSpPr>
+        <p:spPr>
+          <a:xfrm>
+            <a:off x="1154955" y="4056966"/>
+            <a:ext cx="6881007" cy="861420"/>
+          </a:xfrm>
+        </p:spPr>
+        <p:txBody>
+          <a:bodyPr/>
+          <a:lstStyle/>
+          <a:p>
+            <a:pPr algn="r"/>
+            <a:r>
+              <a:rPr lang="en-US" dirty="0"/>
+              <a:t>LOYOLA UNIVERSITY CHICAGO</a:t>
+            </a:r>
+          </a:p>
+        </p:txBody>
+      </p:sp>
+      <p:pic>
+        <p:nvPicPr>
+          <p:cNvPr id="6" name="Picture 5" descr="A picture containing drawing, food, light, shirt&#10;&#10;Description automatically generated">
+            <a:extLst>
+              <a:ext uri="{FF2B5EF4-FFF2-40B4-BE49-F238E27FC236}">
+                <a16:creationId xmlns:a16="http://schemas.microsoft.com/office/drawing/2014/main" id="{D8F7DF7E-0156-6044-85B5-D21BEF3C4990}"/>
+              </a:ext>
+            </a:extLst>
+          </p:cNvPr>
+          <p:cNvPicPr>
+            <a:picLocks noChangeAspect="1"/>
+          </p:cNvPicPr>
+          <p:nvPr/>
+        </p:nvPicPr>
+        <p:blipFill>
+          <a:blip r:embed="rId2"/>
+          <a:stretch>
+            <a:fillRect/>
+          </a:stretch>
+        </p:blipFill>
+        <p:spPr>
+          <a:xfrm>
+            <a:off x="3719285" y="1132850"/>
+            <a:ext cx="3175000" cy="3175000"/>
+          </a:xfrm>
+          <a:prstGeom prst="rect">
+            <a:avLst/>
+          </a:prstGeom>
+        </p:spPr>
+      </p:pic>
+      <p:sp>
+        <p:nvSpPr>
+          <p:cNvPr id="5" name="Subtitle 2">
+            <a:extLst>
+              <a:ext uri="{FF2B5EF4-FFF2-40B4-BE49-F238E27FC236}">
+                <a16:creationId xmlns:a16="http://schemas.microsoft.com/office/drawing/2014/main" id="{5A0AB1ED-7DAB-2C4F-BBE5-087ADCCAF858}"/>
+              </a:ext>
+            </a:extLst>
+          </p:cNvPr>
+          <p:cNvSpPr txBox="1">
+            <a:spLocks/>
+          </p:cNvSpPr>
+          <p:nvPr/>
+        </p:nvSpPr>
+        <p:spPr bwMode="gray">
+          <a:xfrm>
+            <a:off x="5471632" y="4487676"/>
+            <a:ext cx="2564330" cy="861420"/>
+          </a:xfrm>
+          <a:prstGeom prst="rect">
+            <a:avLst/>
+          </a:prstGeom>
+        </p:spPr>
+        <p:txBody>
+          <a:bodyPr vert="horz" lIns="91440" tIns="45720" rIns="91440" bIns="45720" rtlCol="0" anchor="t">
+            <a:normAutofit/>
+          </a:bodyPr>
+          <a:lstStyle>
+            <a:lvl1pPr marL="0" indent="0" algn="l" defTabSz="457200" rtl="0" eaLnBrk="1" latinLnBrk="0" hangingPunct="1">
+              <a:spcBef>
+                <a:spcPts val="1000"/>
+              </a:spcBef>
+              <a:spcAft>
+                <a:spcPts val="0"/>
+              </a:spcAft>
+              <a:buClr>
+                <a:schemeClr val="accent1"/>
+              </a:buClr>
+              <a:buSzPct val="80000"/>
+              <a:buFont typeface="Wingdings 3" charset="2"/>
+              <a:buNone/>
+              <a:defRPr sz="1800" b="0" i="0" kern="1200" cap="all">
+                <a:solidFill>
+                  <a:schemeClr val="accent1">
+                    <a:lumMod val="60000"/>
+                    <a:lumOff val="40000"/>
+                  </a:schemeClr>
+                </a:solidFill>
+                <a:latin typeface="+mn-lt"/>
+                <a:ea typeface="+mn-ea"/>
+                <a:cs typeface="+mn-cs"/>
+              </a:defRPr>
+            </a:lvl1pPr>
+            <a:lvl2pPr marL="457200" indent="0" algn="ctr" defTabSz="457200" rtl="0" eaLnBrk="1" latinLnBrk="0" hangingPunct="1">
+              <a:spcBef>
+                <a:spcPts val="1000"/>
+              </a:spcBef>
+              <a:spcAft>
+                <a:spcPts val="0"/>
+              </a:spcAft>
+              <a:buClr>
+                <a:schemeClr val="accent1"/>
+              </a:buClr>
+              <a:buSzPct val="80000"/>
+              <a:buFont typeface="Wingdings 3" charset="2"/>
+              <a:buNone/>
+              <a:defRPr sz="1600" b="0" i="0" kern="1200">
+                <a:solidFill>
+                  <a:schemeClr val="tx1">
+                    <a:tint val="75000"/>
+                  </a:schemeClr>
+                </a:solidFill>
+                <a:latin typeface="+mn-lt"/>
+                <a:ea typeface="+mn-ea"/>
+                <a:cs typeface="+mn-cs"/>
+              </a:defRPr>
+            </a:lvl2pPr>
+            <a:lvl3pPr marL="914400" indent="0" algn="ctr" defTabSz="457200" rtl="0" eaLnBrk="1" latinLnBrk="0" hangingPunct="1">
+              <a:spcBef>
+                <a:spcPts val="1000"/>
+              </a:spcBef>
+              <a:spcAft>
+                <a:spcPts val="0"/>
+              </a:spcAft>
+              <a:buClr>
+                <a:schemeClr val="accent1"/>
+              </a:buClr>
+              <a:buSzPct val="80000"/>
+              <a:buFont typeface="Wingdings 3" charset="2"/>
+              <a:buNone/>
+              <a:defRPr sz="1400" b="0" i="0" kern="1200">
+                <a:solidFill>
+                  <a:schemeClr val="tx1">
+                    <a:tint val="75000"/>
+                  </a:schemeClr>
+                </a:solidFill>
+                <a:latin typeface="+mn-lt"/>
+                <a:ea typeface="+mn-ea"/>
+                <a:cs typeface="+mn-cs"/>
+              </a:defRPr>
+            </a:lvl3pPr>
+            <a:lvl4pPr marL="1371600" indent="0" algn="ctr" defTabSz="457200" rtl="0" eaLnBrk="1" latinLnBrk="0" hangingPunct="1">
+              <a:spcBef>
+                <a:spcPts val="1000"/>
+              </a:spcBef>
+              <a:spcAft>
+                <a:spcPts val="0"/>
+              </a:spcAft>
+              <a:buClr>
+                <a:schemeClr val="accent1"/>
+              </a:buClr>
+              <a:buSzPct val="80000"/>
+              <a:buFont typeface="Wingdings 3" charset="2"/>
+              <a:buNone/>
+              <a:defRPr sz="1200" b="0" i="0" kern="1200">
+                <a:solidFill>
+                  <a:schemeClr val="tx1">
+                    <a:tint val="75000"/>
+                  </a:schemeClr>
+                </a:solidFill>
+                <a:latin typeface="+mn-lt"/>
+                <a:ea typeface="+mn-ea"/>
+                <a:cs typeface="+mn-cs"/>
+              </a:defRPr>
+            </a:lvl4pPr>
+            <a:lvl5pPr marL="1828800" indent="0" algn="ctr" defTabSz="457200" rtl="0" eaLnBrk="1" latinLnBrk="0" hangingPunct="1">
+              <a:spcBef>
+                <a:spcPts val="1000"/>
+              </a:spcBef>
+              <a:spcAft>
+                <a:spcPts val="0"/>
+              </a:spcAft>
+              <a:buClr>
+                <a:schemeClr val="accent1"/>
+              </a:buClr>
+              <a:buSzPct val="80000"/>
+              <a:buFont typeface="Wingdings 3" charset="2"/>
+              <a:buNone/>
+              <a:defRPr sz="1200" b="0" i="0" kern="1200">
+                <a:solidFill>
+                  <a:schemeClr val="tx1">
+                    <a:tint val="75000"/>
+                  </a:schemeClr>
+                </a:solidFill>
+                <a:latin typeface="+mn-lt"/>
+                <a:ea typeface="+mn-ea"/>
+                <a:cs typeface="+mn-cs"/>
+              </a:defRPr>
+            </a:lvl5pPr>
+            <a:lvl6pPr marL="2286000" indent="0" algn="ctr" defTabSz="457200" rtl="0" eaLnBrk="1" latinLnBrk="0" hangingPunct="1">
+              <a:spcBef>
+                <a:spcPts val="1000"/>
+              </a:spcBef>
+              <a:spcAft>
+                <a:spcPts val="0"/>
+              </a:spcAft>
+              <a:buClr>
+                <a:schemeClr val="accent1"/>
+              </a:buClr>
+              <a:buSzPct val="80000"/>
+              <a:buFont typeface="Wingdings 3" charset="2"/>
+              <a:buNone/>
+              <a:defRPr sz="1200" b="0" i="0" kern="1200">
+                <a:solidFill>
+                  <a:schemeClr val="tx1">
+                    <a:tint val="75000"/>
+                  </a:schemeClr>
+                </a:solidFill>
+                <a:latin typeface="+mn-lt"/>
+                <a:ea typeface="+mn-ea"/>
+                <a:cs typeface="+mn-cs"/>
+              </a:defRPr>
+            </a:lvl6pPr>
+            <a:lvl7pPr marL="2743200" indent="0" algn="ctr" defTabSz="457200" rtl="0" eaLnBrk="1" latinLnBrk="0" hangingPunct="1">
+              <a:spcBef>
+                <a:spcPts val="1000"/>
+              </a:spcBef>
+              <a:spcAft>
+                <a:spcPts val="0"/>
+              </a:spcAft>
+              <a:buClr>
+                <a:schemeClr val="accent1"/>
+              </a:buClr>
+              <a:buSzPct val="80000"/>
+              <a:buFont typeface="Wingdings 3" charset="2"/>
+              <a:buNone/>
+              <a:defRPr sz="1200" b="0" i="0" kern="1200">
+                <a:solidFill>
+                  <a:schemeClr val="tx1">
+                    <a:tint val="75000"/>
+                  </a:schemeClr>
+                </a:solidFill>
+                <a:latin typeface="+mn-lt"/>
+                <a:ea typeface="+mn-ea"/>
+                <a:cs typeface="+mn-cs"/>
+              </a:defRPr>
+            </a:lvl7pPr>
+            <a:lvl8pPr marL="3200400" indent="0" algn="ctr" defTabSz="457200" rtl="0" eaLnBrk="1" latinLnBrk="0" hangingPunct="1">
+              <a:spcBef>
+                <a:spcPts val="1000"/>
+              </a:spcBef>
+              <a:spcAft>
+                <a:spcPts val="0"/>
+              </a:spcAft>
+              <a:buClr>
+                <a:schemeClr val="accent1"/>
+              </a:buClr>
+              <a:buSzPct val="80000"/>
+              <a:buFont typeface="Wingdings 3" charset="2"/>
+              <a:buNone/>
+              <a:defRPr sz="1200" b="0" i="0" kern="1200">
+                <a:solidFill>
+                  <a:schemeClr val="tx1">
+                    <a:tint val="75000"/>
+                  </a:schemeClr>
+                </a:solidFill>
+                <a:latin typeface="+mn-lt"/>
+                <a:ea typeface="+mn-ea"/>
+                <a:cs typeface="+mn-cs"/>
+              </a:defRPr>
+            </a:lvl8pPr>
+            <a:lvl9pPr marL="3657600" indent="0" algn="ctr" defTabSz="457200" rtl="0" eaLnBrk="1" latinLnBrk="0" hangingPunct="1">
+              <a:spcBef>
+                <a:spcPts val="1000"/>
+              </a:spcBef>
+              <a:spcAft>
+                <a:spcPts val="0"/>
+              </a:spcAft>
+              <a:buClr>
+                <a:schemeClr val="accent1"/>
+              </a:buClr>
+              <a:buSzPct val="80000"/>
+              <a:buFont typeface="Wingdings 3" charset="2"/>
+              <a:buNone/>
+              <a:defRPr sz="1200" b="0" i="0" kern="1200">
+                <a:solidFill>
+                  <a:schemeClr val="tx1">
+                    <a:tint val="75000"/>
+                  </a:schemeClr>
+                </a:solidFill>
+                <a:latin typeface="+mn-lt"/>
+                <a:ea typeface="+mn-ea"/>
+                <a:cs typeface="+mn-cs"/>
+              </a:defRPr>
+            </a:lvl9pPr>
+          </a:lstStyle>
+          <a:p>
+            <a:pPr algn="r"/>
+            <a:r>
+              <a:rPr lang="en-US" b="1" dirty="0"/>
+              <a:t>9 AM – 10 AM</a:t>
+            </a:r>
+          </a:p>
+        </p:txBody>
+      </p:sp>
+      <p:sp>
+        <p:nvSpPr>
+          <p:cNvPr id="4" name="Rectangle 3">
+            <a:extLst>
+              <a:ext uri="{FF2B5EF4-FFF2-40B4-BE49-F238E27FC236}">
+                <a16:creationId xmlns:a16="http://schemas.microsoft.com/office/drawing/2014/main" id="{75EB4702-8FF9-E548-B316-3921ED0CA012}"/>
+              </a:ext>
+            </a:extLst>
+          </p:cNvPr>
+          <p:cNvSpPr/>
+          <p:nvPr/>
+        </p:nvSpPr>
+        <p:spPr>
+          <a:xfrm>
+            <a:off x="6477232" y="4888534"/>
+            <a:ext cx="274320" cy="91440"/>
+          </a:xfrm>
+          <a:prstGeom prst="rect">
+            <a:avLst/>
+          </a:prstGeom>
+          <a:ln>
+            <a:noFill/>
+          </a:ln>
+        </p:spPr>
+        <p:style>
+          <a:lnRef idx="2">
+            <a:schemeClr val="accent1">
+              <a:shade val="50000"/>
+            </a:schemeClr>
+          </a:lnRef>
+          <a:fillRef idx="1">
+            <a:schemeClr val="accent1"/>
+          </a:fillRef>
+          <a:effectRef idx="0">
+            <a:schemeClr val="accent1"/>
+          </a:effectRef>
+          <a:fontRef idx="minor">
+            <a:schemeClr val="lt1"/>
+          </a:fontRef>
+        </p:style>
+        <p:txBody>
+          <a:bodyPr rtlCol="0" anchor="ctr"/>
+          <a:lstStyle/>
+          <a:p>
+            <a:pPr algn="ctr"/>
+            <a:endParaRPr lang="en-US" dirty="0"/>
+          </a:p>
+        </p:txBody>
+      </p:sp>
+      <p:sp>
+        <p:nvSpPr>
+          <p:cNvPr id="8" name="Rectangle 7">
+            <a:extLst>
+              <a:ext uri="{FF2B5EF4-FFF2-40B4-BE49-F238E27FC236}">
+                <a16:creationId xmlns:a16="http://schemas.microsoft.com/office/drawing/2014/main" id="{D4F15DA0-5919-3B45-89B3-DEA88B6DDCD5}"/>
+              </a:ext>
+            </a:extLst>
+          </p:cNvPr>
+          <p:cNvSpPr/>
+          <p:nvPr/>
+        </p:nvSpPr>
+        <p:spPr>
+          <a:xfrm>
+            <a:off x="6881602" y="4888534"/>
+            <a:ext cx="274320" cy="91440"/>
+          </a:xfrm>
+          <a:prstGeom prst="rect">
+            <a:avLst/>
+          </a:prstGeom>
+          <a:ln>
+            <a:noFill/>
+          </a:ln>
+        </p:spPr>
+        <p:style>
+          <a:lnRef idx="2">
+            <a:schemeClr val="accent1">
+              <a:shade val="50000"/>
+            </a:schemeClr>
+          </a:lnRef>
+          <a:fillRef idx="1">
+            <a:schemeClr val="accent1"/>
+          </a:fillRef>
+          <a:effectRef idx="0">
+            <a:schemeClr val="accent1"/>
+          </a:effectRef>
+          <a:fontRef idx="minor">
+            <a:schemeClr val="lt1"/>
+          </a:fontRef>
+        </p:style>
+        <p:txBody>
+          <a:bodyPr rtlCol="0" anchor="ctr"/>
+          <a:lstStyle/>
+          <a:p>
+            <a:pPr algn="ctr"/>
+            <a:endParaRPr lang="en-US" dirty="0"/>
+          </a:p>
+        </p:txBody>
+      </p:sp>
+      <p:sp>
+        <p:nvSpPr>
+          <p:cNvPr id="9" name="Rectangle 8">
+            <a:extLst>
+              <a:ext uri="{FF2B5EF4-FFF2-40B4-BE49-F238E27FC236}">
+                <a16:creationId xmlns:a16="http://schemas.microsoft.com/office/drawing/2014/main" id="{6C0FB79F-EACC-7B4E-8694-75D978BD5718}"/>
+              </a:ext>
+            </a:extLst>
+          </p:cNvPr>
+          <p:cNvSpPr/>
+          <p:nvPr/>
+        </p:nvSpPr>
+        <p:spPr>
+          <a:xfrm>
+            <a:off x="7285972" y="4888534"/>
+            <a:ext cx="274320" cy="91440"/>
+          </a:xfrm>
+          <a:prstGeom prst="rect">
+            <a:avLst/>
+          </a:prstGeom>
+          <a:ln>
+            <a:noFill/>
+          </a:ln>
+        </p:spPr>
+        <p:style>
+          <a:lnRef idx="2">
+            <a:schemeClr val="accent1">
+              <a:shade val="50000"/>
+            </a:schemeClr>
+          </a:lnRef>
+          <a:fillRef idx="1">
+            <a:schemeClr val="accent1"/>
+          </a:fillRef>
+          <a:effectRef idx="0">
+            <a:schemeClr val="accent1"/>
+          </a:effectRef>
+          <a:fontRef idx="minor">
+            <a:schemeClr val="lt1"/>
+          </a:fontRef>
+        </p:style>
+        <p:txBody>
+          <a:bodyPr rtlCol="0" anchor="ctr"/>
+          <a:lstStyle/>
+          <a:p>
+            <a:pPr algn="ctr"/>
+            <a:endParaRPr lang="en-US" dirty="0"/>
+          </a:p>
+        </p:txBody>
+      </p:sp>
+      <p:sp>
+        <p:nvSpPr>
+          <p:cNvPr id="10" name="Rectangle 9">
+            <a:extLst>
+              <a:ext uri="{FF2B5EF4-FFF2-40B4-BE49-F238E27FC236}">
+                <a16:creationId xmlns:a16="http://schemas.microsoft.com/office/drawing/2014/main" id="{34A30568-5128-FC45-BF58-3AA1B8B7F948}"/>
+              </a:ext>
+            </a:extLst>
+          </p:cNvPr>
+          <p:cNvSpPr/>
+          <p:nvPr/>
+        </p:nvSpPr>
+        <p:spPr>
+          <a:xfrm>
+            <a:off x="7690342" y="4888534"/>
+            <a:ext cx="274320" cy="91440"/>
+          </a:xfrm>
+          <a:prstGeom prst="rect">
+            <a:avLst/>
+          </a:prstGeom>
+          <a:solidFill>
+            <a:schemeClr val="accent6"/>
+          </a:solidFill>
+          <a:ln>
+            <a:noFill/>
+          </a:ln>
+        </p:spPr>
+        <p:style>
+          <a:lnRef idx="2">
+            <a:schemeClr val="accent1">
+              <a:shade val="50000"/>
+            </a:schemeClr>
+          </a:lnRef>
+          <a:fillRef idx="1">
+            <a:schemeClr val="accent1"/>
+          </a:fillRef>
+          <a:effectRef idx="0">
+            <a:schemeClr val="accent1"/>
+          </a:effectRef>
+          <a:fontRef idx="minor">
+            <a:schemeClr val="lt1"/>
+          </a:fontRef>
+        </p:style>
+        <p:txBody>
+          <a:bodyPr rtlCol="0" anchor="ctr"/>
+          <a:lstStyle/>
+          <a:p>
+            <a:pPr algn="ctr"/>
+            <a:endParaRPr lang="en-US" dirty="0"/>
+          </a:p>
+        </p:txBody>
+      </p:sp>
+    </p:spTree>
+    <p:extLst>
+      <p:ext uri="{BB962C8B-B14F-4D97-AF65-F5344CB8AC3E}">
+        <p14:creationId xmlns:p14="http://schemas.microsoft.com/office/powerpoint/2010/main" val="1849157456"/>
       </p:ext>
     </p:extLst>
   </p:cSld>

</xml_diff>

<commit_message>
Update for 10 Oct 2020
</commit_message>
<xml_diff>
--- a/opening screen.pptx
+++ b/opening screen.pptx
@@ -453,7 +453,7 @@
             <a:fld id="{5923F103-BC34-4FE4-A40E-EDDEECFDA5D0}" type="datetimeFigureOut">
               <a:rPr lang="en-US" dirty="0"/>
               <a:pPr/>
-              <a:t>9/19/20</a:t>
+              <a:t>10/10/20</a:t>
             </a:fld>
             <a:endParaRPr lang="en-US" dirty="0"/>
           </a:p>
@@ -563,9 +563,18 @@
   <p:clrMapOvr>
     <a:masterClrMapping/>
   </p:clrMapOvr>
-  <p:transition spd="slow" advClick="0" advTm="1000">
-    <p:fade/>
-  </p:transition>
+  <mc:AlternateContent xmlns:mc="http://schemas.openxmlformats.org/markup-compatibility/2006">
+    <mc:Choice xmlns:p14="http://schemas.microsoft.com/office/powerpoint/2010/main" Requires="p14">
+      <p:transition p14:dur="250" advClick="0" advTm="500">
+        <p:fade/>
+      </p:transition>
+    </mc:Choice>
+    <mc:Fallback>
+      <p:transition advClick="0" advTm="500">
+        <p:fade/>
+      </p:transition>
+    </mc:Fallback>
+  </mc:AlternateContent>
 </p:sldLayout>
 </file>
 
@@ -1540,7 +1549,7 @@
           <a:p>
             <a:fld id="{923A1CC3-2375-41D4-9E03-427CAF2A4C1A}" type="datetimeFigureOut">
               <a:rPr lang="en-US" dirty="0"/>
-              <a:t>9/19/20</a:t>
+              <a:t>10/10/20</a:t>
             </a:fld>
             <a:endParaRPr lang="en-US" dirty="0"/>
           </a:p>
@@ -1630,9 +1639,18 @@
   <p:clrMapOvr>
     <a:masterClrMapping/>
   </p:clrMapOvr>
-  <p:transition spd="slow" advClick="0" advTm="1000">
-    <p:fade/>
-  </p:transition>
+  <mc:AlternateContent xmlns:mc="http://schemas.openxmlformats.org/markup-compatibility/2006">
+    <mc:Choice xmlns:p14="http://schemas.microsoft.com/office/powerpoint/2010/main" Requires="p14">
+      <p:transition p14:dur="250" advClick="0" advTm="500">
+        <p:fade/>
+      </p:transition>
+    </mc:Choice>
+    <mc:Fallback>
+      <p:transition advClick="0" advTm="500">
+        <p:fade/>
+      </p:transition>
+    </mc:Fallback>
+  </mc:AlternateContent>
 </p:sldLayout>
 </file>
 
@@ -2519,7 +2537,7 @@
           <a:p>
             <a:fld id="{AFF16868-8199-4C2C-A5B1-63AEE139F88E}" type="datetimeFigureOut">
               <a:rPr lang="en-US" dirty="0"/>
-              <a:t>9/19/20</a:t>
+              <a:t>10/10/20</a:t>
             </a:fld>
             <a:endParaRPr lang="en-US" dirty="0"/>
           </a:p>
@@ -2609,9 +2627,18 @@
   <p:clrMapOvr>
     <a:masterClrMapping/>
   </p:clrMapOvr>
-  <p:transition spd="slow" advClick="0" advTm="1000">
-    <p:fade/>
-  </p:transition>
+  <mc:AlternateContent xmlns:mc="http://schemas.openxmlformats.org/markup-compatibility/2006">
+    <mc:Choice xmlns:p14="http://schemas.microsoft.com/office/powerpoint/2010/main" Requires="p14">
+      <p:transition p14:dur="250" advClick="0" advTm="500">
+        <p:fade/>
+      </p:transition>
+    </mc:Choice>
+    <mc:Fallback>
+      <p:transition advClick="0" advTm="500">
+        <p:fade/>
+      </p:transition>
+    </mc:Fallback>
+  </mc:AlternateContent>
 </p:sldLayout>
 </file>
 
@@ -3652,7 +3679,7 @@
           <a:p>
             <a:fld id="{AAD9FF7F-6988-44CC-821B-644E70CD2F73}" type="datetimeFigureOut">
               <a:rPr lang="en-US" dirty="0"/>
-              <a:t>9/19/20</a:t>
+              <a:t>10/10/20</a:t>
             </a:fld>
             <a:endParaRPr lang="en-US" dirty="0"/>
           </a:p>
@@ -3742,9 +3769,18 @@
   <p:clrMapOvr>
     <a:masterClrMapping/>
   </p:clrMapOvr>
-  <p:transition spd="slow" advClick="0" advTm="1000">
-    <p:fade/>
-  </p:transition>
+  <mc:AlternateContent xmlns:mc="http://schemas.openxmlformats.org/markup-compatibility/2006">
+    <mc:Choice xmlns:p14="http://schemas.microsoft.com/office/powerpoint/2010/main" Requires="p14">
+      <p:transition p14:dur="250" advClick="0" advTm="500">
+        <p:fade/>
+      </p:transition>
+    </mc:Choice>
+    <mc:Fallback>
+      <p:transition advClick="0" advTm="500">
+        <p:fade/>
+      </p:transition>
+    </mc:Fallback>
+  </mc:AlternateContent>
 </p:sldLayout>
 </file>
 
@@ -4684,7 +4720,7 @@
           <a:p>
             <a:fld id="{5C12C299-16B2-4475-990D-751901EACC14}" type="datetimeFigureOut">
               <a:rPr lang="en-US" dirty="0"/>
-              <a:t>9/19/20</a:t>
+              <a:t>10/10/20</a:t>
             </a:fld>
             <a:endParaRPr lang="en-US" dirty="0"/>
           </a:p>
@@ -4774,9 +4810,18 @@
   <p:clrMapOvr>
     <a:masterClrMapping/>
   </p:clrMapOvr>
-  <p:transition spd="slow" advClick="0" advTm="1000">
-    <p:fade/>
-  </p:transition>
+  <mc:AlternateContent xmlns:mc="http://schemas.openxmlformats.org/markup-compatibility/2006">
+    <mc:Choice xmlns:p14="http://schemas.microsoft.com/office/powerpoint/2010/main" Requires="p14">
+      <p:transition p14:dur="250" advClick="0" advTm="500">
+        <p:fade/>
+      </p:transition>
+    </mc:Choice>
+    <mc:Fallback>
+      <p:transition advClick="0" advTm="500">
+        <p:fade/>
+      </p:transition>
+    </mc:Fallback>
+  </mc:AlternateContent>
 </p:sldLayout>
 </file>
 
@@ -5343,7 +5388,7 @@
           <a:p>
             <a:fld id="{9FE86839-B9D8-4651-8783-F325ECE74E65}" type="datetimeFigureOut">
               <a:rPr lang="en-US" dirty="0"/>
-              <a:t>9/19/20</a:t>
+              <a:t>10/10/20</a:t>
             </a:fld>
             <a:endParaRPr lang="en-US" dirty="0"/>
           </a:p>
@@ -5397,9 +5442,18 @@
   <p:clrMapOvr>
     <a:masterClrMapping/>
   </p:clrMapOvr>
-  <p:transition spd="slow" advClick="0" advTm="1000">
-    <p:fade/>
-  </p:transition>
+  <mc:AlternateContent xmlns:mc="http://schemas.openxmlformats.org/markup-compatibility/2006">
+    <mc:Choice xmlns:p14="http://schemas.microsoft.com/office/powerpoint/2010/main" Requires="p14">
+      <p:transition p14:dur="250" advClick="0" advTm="500">
+        <p:fade/>
+      </p:transition>
+    </mc:Choice>
+    <mc:Fallback>
+      <p:transition advClick="0" advTm="500">
+        <p:fade/>
+      </p:transition>
+    </mc:Fallback>
+  </mc:AlternateContent>
 </p:sldLayout>
 </file>
 
@@ -6203,7 +6257,7 @@
           <a:p>
             <a:fld id="{FD484F64-32F6-45C5-931F-ADC1662401D0}" type="datetimeFigureOut">
               <a:rPr lang="en-US" dirty="0"/>
-              <a:t>9/19/20</a:t>
+              <a:t>10/10/20</a:t>
             </a:fld>
             <a:endParaRPr lang="en-US" dirty="0"/>
           </a:p>
@@ -6262,9 +6316,18 @@
   <p:clrMapOvr>
     <a:masterClrMapping/>
   </p:clrMapOvr>
-  <p:transition spd="slow" advClick="0" advTm="1000">
-    <p:fade/>
-  </p:transition>
+  <mc:AlternateContent xmlns:mc="http://schemas.openxmlformats.org/markup-compatibility/2006">
+    <mc:Choice xmlns:p14="http://schemas.microsoft.com/office/powerpoint/2010/main" Requires="p14">
+      <p:transition p14:dur="250" advClick="0" advTm="500">
+        <p:fade/>
+      </p:transition>
+    </mc:Choice>
+    <mc:Fallback>
+      <p:transition advClick="0" advTm="500">
+        <p:fade/>
+      </p:transition>
+    </mc:Fallback>
+  </mc:AlternateContent>
 </p:sldLayout>
 </file>
 
@@ -6392,7 +6455,7 @@
           <a:p>
             <a:fld id="{53086D93-FCAC-47E0-A2EE-787E62CA814C}" type="datetimeFigureOut">
               <a:rPr lang="en-US" dirty="0"/>
-              <a:t>9/19/20</a:t>
+              <a:t>10/10/20</a:t>
             </a:fld>
             <a:endParaRPr lang="en-US" dirty="0"/>
           </a:p>
@@ -6446,9 +6509,18 @@
   <p:clrMapOvr>
     <a:masterClrMapping/>
   </p:clrMapOvr>
-  <p:transition spd="slow" advClick="0" advTm="1000">
-    <p:fade/>
-  </p:transition>
+  <mc:AlternateContent xmlns:mc="http://schemas.openxmlformats.org/markup-compatibility/2006">
+    <mc:Choice xmlns:p14="http://schemas.microsoft.com/office/powerpoint/2010/main" Requires="p14">
+      <p:transition p14:dur="250" advClick="0" advTm="500">
+        <p:fade/>
+      </p:transition>
+    </mc:Choice>
+    <mc:Fallback>
+      <p:transition advClick="0" advTm="500">
+        <p:fade/>
+      </p:transition>
+    </mc:Fallback>
+  </mc:AlternateContent>
 </p:sldLayout>
 </file>
 
@@ -7363,7 +7435,7 @@
           <a:p>
             <a:fld id="{CDA879A6-0FD0-4734-A311-86BFCA472E6E}" type="datetimeFigureOut">
               <a:rPr lang="en-US" dirty="0"/>
-              <a:t>9/19/20</a:t>
+              <a:t>10/10/20</a:t>
             </a:fld>
             <a:endParaRPr lang="en-US" dirty="0"/>
           </a:p>
@@ -7453,9 +7525,18 @@
   <p:clrMapOvr>
     <a:masterClrMapping/>
   </p:clrMapOvr>
-  <p:transition spd="slow" advClick="0" advTm="1000">
-    <p:fade/>
-  </p:transition>
+  <mc:AlternateContent xmlns:mc="http://schemas.openxmlformats.org/markup-compatibility/2006">
+    <mc:Choice xmlns:p14="http://schemas.microsoft.com/office/powerpoint/2010/main" Requires="p14">
+      <p:transition p14:dur="250" advClick="0" advTm="500">
+        <p:fade/>
+      </p:transition>
+    </mc:Choice>
+    <mc:Fallback>
+      <p:transition advClick="0" advTm="500">
+        <p:fade/>
+      </p:transition>
+    </mc:Fallback>
+  </mc:AlternateContent>
 </p:sldLayout>
 </file>
 
@@ -7573,7 +7654,7 @@
           <a:p>
             <a:fld id="{19C9CA7B-DFD4-44B5-8C60-D14B8CD1FB59}" type="datetimeFigureOut">
               <a:rPr lang="en-US" dirty="0"/>
-              <a:t>9/19/20</a:t>
+              <a:t>10/10/20</a:t>
             </a:fld>
             <a:endParaRPr lang="en-US" dirty="0"/>
           </a:p>
@@ -7627,9 +7708,18 @@
   <p:clrMapOvr>
     <a:masterClrMapping/>
   </p:clrMapOvr>
-  <p:transition spd="slow" advClick="0" advTm="1000">
-    <p:fade/>
-  </p:transition>
+  <mc:AlternateContent xmlns:mc="http://schemas.openxmlformats.org/markup-compatibility/2006">
+    <mc:Choice xmlns:p14="http://schemas.microsoft.com/office/powerpoint/2010/main" Requires="p14">
+      <p:transition p14:dur="250" advClick="0" advTm="500">
+        <p:fade/>
+      </p:transition>
+    </mc:Choice>
+    <mc:Fallback>
+      <p:transition advClick="0" advTm="500">
+        <p:fade/>
+      </p:transition>
+    </mc:Fallback>
+  </mc:AlternateContent>
 </p:sldLayout>
 </file>
 
@@ -8606,7 +8696,7 @@
           <a:p>
             <a:fld id="{F34E6425-0181-43F2-84FC-787E803FD2F8}" type="datetimeFigureOut">
               <a:rPr lang="en-US" dirty="0"/>
-              <a:t>9/19/20</a:t>
+              <a:t>10/10/20</a:t>
             </a:fld>
             <a:endParaRPr lang="en-US" dirty="0"/>
           </a:p>
@@ -8696,9 +8786,18 @@
   <p:clrMapOvr>
     <a:masterClrMapping/>
   </p:clrMapOvr>
-  <p:transition spd="slow" advClick="0" advTm="1000">
-    <p:fade/>
-  </p:transition>
+  <mc:AlternateContent xmlns:mc="http://schemas.openxmlformats.org/markup-compatibility/2006">
+    <mc:Choice xmlns:p14="http://schemas.microsoft.com/office/powerpoint/2010/main" Requires="p14">
+      <p:transition p14:dur="250" advClick="0" advTm="500">
+        <p:fade/>
+      </p:transition>
+    </mc:Choice>
+    <mc:Fallback>
+      <p:transition advClick="0" advTm="500">
+        <p:fade/>
+      </p:transition>
+    </mc:Fallback>
+  </mc:AlternateContent>
 </p:sldLayout>
 </file>
 
@@ -8877,7 +8976,7 @@
           <a:p>
             <a:fld id="{3BDB8791-F1B0-41E7-B7FD-A781E65C4266}" type="datetimeFigureOut">
               <a:rPr lang="en-US" dirty="0"/>
-              <a:t>9/19/20</a:t>
+              <a:t>10/10/20</a:t>
             </a:fld>
             <a:endParaRPr lang="en-US" dirty="0"/>
           </a:p>
@@ -8931,9 +9030,18 @@
   <p:clrMapOvr>
     <a:masterClrMapping/>
   </p:clrMapOvr>
-  <p:transition spd="slow" advClick="0" advTm="1000">
-    <p:fade/>
-  </p:transition>
+  <mc:AlternateContent xmlns:mc="http://schemas.openxmlformats.org/markup-compatibility/2006">
+    <mc:Choice xmlns:p14="http://schemas.microsoft.com/office/powerpoint/2010/main" Requires="p14">
+      <p:transition p14:dur="250" advClick="0" advTm="500">
+        <p:fade/>
+      </p:transition>
+    </mc:Choice>
+    <mc:Fallback>
+      <p:transition advClick="0" advTm="500">
+        <p:fade/>
+      </p:transition>
+    </mc:Fallback>
+  </mc:AlternateContent>
 </p:sldLayout>
 </file>
 
@@ -9286,7 +9394,7 @@
           <a:p>
             <a:fld id="{5FDD63B2-E120-4ED8-B27B-C685F510A5FE}" type="datetimeFigureOut">
               <a:rPr lang="en-US" dirty="0"/>
-              <a:t>9/19/20</a:t>
+              <a:t>10/10/20</a:t>
             </a:fld>
             <a:endParaRPr lang="en-US" dirty="0"/>
           </a:p>
@@ -9340,9 +9448,18 @@
   <p:clrMapOvr>
     <a:masterClrMapping/>
   </p:clrMapOvr>
-  <p:transition spd="slow" advClick="0" advTm="1000">
-    <p:fade/>
-  </p:transition>
+  <mc:AlternateContent xmlns:mc="http://schemas.openxmlformats.org/markup-compatibility/2006">
+    <mc:Choice xmlns:p14="http://schemas.microsoft.com/office/powerpoint/2010/main" Requires="p14">
+      <p:transition p14:dur="250" advClick="0" advTm="500">
+        <p:fade/>
+      </p:transition>
+    </mc:Choice>
+    <mc:Fallback>
+      <p:transition advClick="0" advTm="500">
+        <p:fade/>
+      </p:transition>
+    </mc:Fallback>
+  </mc:AlternateContent>
 </p:sldLayout>
 </file>
 
@@ -9412,7 +9529,7 @@
           <a:p>
             <a:fld id="{7AA18ACC-A947-437B-A130-35BD54FDF1E9}" type="datetimeFigureOut">
               <a:rPr lang="en-US" dirty="0"/>
-              <a:t>9/19/20</a:t>
+              <a:t>10/10/20</a:t>
             </a:fld>
             <a:endParaRPr lang="en-US" dirty="0"/>
           </a:p>
@@ -9466,9 +9583,18 @@
   <p:clrMapOvr>
     <a:masterClrMapping/>
   </p:clrMapOvr>
-  <p:transition spd="slow" advClick="0" advTm="1000">
-    <p:fade/>
-  </p:transition>
+  <mc:AlternateContent xmlns:mc="http://schemas.openxmlformats.org/markup-compatibility/2006">
+    <mc:Choice xmlns:p14="http://schemas.microsoft.com/office/powerpoint/2010/main" Requires="p14">
+      <p:transition p14:dur="250" advClick="0" advTm="500">
+        <p:fade/>
+      </p:transition>
+    </mc:Choice>
+    <mc:Fallback>
+      <p:transition advClick="0" advTm="500">
+        <p:fade/>
+      </p:transition>
+    </mc:Fallback>
+  </mc:AlternateContent>
 </p:sldLayout>
 </file>
 
@@ -9506,7 +9632,7 @@
           <a:p>
             <a:fld id="{7C8D7E02-BCB8-4D50-A234-369438C08659}" type="datetimeFigureOut">
               <a:rPr lang="en-US" dirty="0"/>
-              <a:t>9/19/20</a:t>
+              <a:t>10/10/20</a:t>
             </a:fld>
             <a:endParaRPr lang="en-US" dirty="0"/>
           </a:p>
@@ -9596,9 +9722,18 @@
   <p:clrMapOvr>
     <a:masterClrMapping/>
   </p:clrMapOvr>
-  <p:transition spd="slow" advClick="0" advTm="1000">
-    <p:fade/>
-  </p:transition>
+  <mc:AlternateContent xmlns:mc="http://schemas.openxmlformats.org/markup-compatibility/2006">
+    <mc:Choice xmlns:p14="http://schemas.microsoft.com/office/powerpoint/2010/main" Requires="p14">
+      <p:transition p14:dur="250" advClick="0" advTm="500">
+        <p:fade/>
+      </p:transition>
+    </mc:Choice>
+    <mc:Fallback>
+      <p:transition advClick="0" advTm="500">
+        <p:fade/>
+      </p:transition>
+    </mc:Fallback>
+  </mc:AlternateContent>
 </p:sldLayout>
 </file>
 
@@ -10586,7 +10721,7 @@
           <a:p>
             <a:fld id="{76E86A4C-8E40-4F87-A4F0-01A0687C5742}" type="datetimeFigureOut">
               <a:rPr lang="en-US" dirty="0"/>
-              <a:t>9/19/20</a:t>
+              <a:t>10/10/20</a:t>
             </a:fld>
             <a:endParaRPr lang="en-US" dirty="0"/>
           </a:p>
@@ -10676,9 +10811,18 @@
   <p:clrMapOvr>
     <a:masterClrMapping/>
   </p:clrMapOvr>
-  <p:transition spd="slow" advClick="0" advTm="1000">
-    <p:fade/>
-  </p:transition>
+  <mc:AlternateContent xmlns:mc="http://schemas.openxmlformats.org/markup-compatibility/2006">
+    <mc:Choice xmlns:p14="http://schemas.microsoft.com/office/powerpoint/2010/main" Requires="p14">
+      <p:transition p14:dur="250" advClick="0" advTm="500">
+        <p:fade/>
+      </p:transition>
+    </mc:Choice>
+    <mc:Fallback>
+      <p:transition advClick="0" advTm="500">
+        <p:fade/>
+      </p:transition>
+    </mc:Fallback>
+  </mc:AlternateContent>
 </p:sldLayout>
 </file>
 
@@ -11693,7 +11837,7 @@
           <a:p>
             <a:fld id="{35E72C73-2D91-4E12-BA25-F0AA0C03599B}" type="datetimeFigureOut">
               <a:rPr lang="en-US" dirty="0"/>
-              <a:t>9/19/20</a:t>
+              <a:t>10/10/20</a:t>
             </a:fld>
             <a:endParaRPr lang="en-US" dirty="0"/>
           </a:p>
@@ -11783,9 +11927,18 @@
   <p:clrMapOvr>
     <a:masterClrMapping/>
   </p:clrMapOvr>
-  <p:transition spd="slow" advClick="0" advTm="1000">
-    <p:fade/>
-  </p:transition>
+  <mc:AlternateContent xmlns:mc="http://schemas.openxmlformats.org/markup-compatibility/2006">
+    <mc:Choice xmlns:p14="http://schemas.microsoft.com/office/powerpoint/2010/main" Requires="p14">
+      <p:transition p14:dur="250" advClick="0" advTm="500">
+        <p:fade/>
+      </p:transition>
+    </mc:Choice>
+    <mc:Fallback>
+      <p:transition advClick="0" advTm="500">
+        <p:fade/>
+      </p:transition>
+    </mc:Fallback>
+  </mc:AlternateContent>
 </p:sldLayout>
 </file>
 
@@ -12689,7 +12842,7 @@
           <a:p>
             <a:fld id="{2BE451C3-0FF4-47C4-B829-773ADF60F88C}" type="datetimeFigureOut">
               <a:rPr lang="en-US" dirty="0"/>
-              <a:t>9/19/20</a:t>
+              <a:t>10/10/20</a:t>
             </a:fld>
             <a:endParaRPr lang="en-US" dirty="0"/>
           </a:p>
@@ -12828,9 +12981,18 @@
     <p:sldLayoutId id="2147483658" r:id="rId16"/>
     <p:sldLayoutId id="2147483659" r:id="rId17"/>
   </p:sldLayoutIdLst>
-  <p:transition spd="slow" advClick="0" advTm="1000">
-    <p:fade/>
-  </p:transition>
+  <mc:AlternateContent xmlns:mc="http://schemas.openxmlformats.org/markup-compatibility/2006">
+    <mc:Choice xmlns:p14="http://schemas.microsoft.com/office/powerpoint/2010/main" Requires="p14">
+      <p:transition p14:dur="250" advClick="0" advTm="500">
+        <p:fade/>
+      </p:transition>
+    </mc:Choice>
+    <mc:Fallback>
+      <p:transition advClick="0" advTm="500">
+        <p:fade/>
+      </p:transition>
+    </mc:Fallback>
+  </mc:AlternateContent>
   <p:hf sldNum="0" hdr="0" ftr="0" dt="0"/>
   <p:txStyles>
     <p:titleStyle>
@@ -13818,9 +13980,18 @@
   <p:clrMapOvr>
     <a:masterClrMapping/>
   </p:clrMapOvr>
-  <p:transition spd="slow" advClick="0" advTm="1000">
-    <p:fade/>
-  </p:transition>
+  <mc:AlternateContent xmlns:mc="http://schemas.openxmlformats.org/markup-compatibility/2006">
+    <mc:Choice xmlns:p14="http://schemas.microsoft.com/office/powerpoint/2010/main" Requires="p14">
+      <p:transition p14:dur="250" advClick="0" advTm="100">
+        <p:fade/>
+      </p:transition>
+    </mc:Choice>
+    <mc:Fallback>
+      <p:transition advClick="0" advTm="100">
+        <p:fade/>
+      </p:transition>
+    </mc:Fallback>
+  </mc:AlternateContent>
 </p:sld>
 </file>
 
@@ -14411,9 +14582,18 @@
   <p:clrMapOvr>
     <a:masterClrMapping/>
   </p:clrMapOvr>
-  <p:transition spd="slow" advClick="0" advTm="1000">
-    <p:fade/>
-  </p:transition>
+  <mc:AlternateContent xmlns:mc="http://schemas.openxmlformats.org/markup-compatibility/2006">
+    <mc:Choice xmlns:p14="http://schemas.microsoft.com/office/powerpoint/2010/main" Requires="p14">
+      <p:transition p14:dur="250" advClick="0" advTm="500">
+        <p:fade/>
+      </p:transition>
+    </mc:Choice>
+    <mc:Fallback>
+      <p:transition advClick="0" advTm="500">
+        <p:fade/>
+      </p:transition>
+    </mc:Fallback>
+  </mc:AlternateContent>
 </p:sld>
 </file>
 
@@ -15001,9 +15181,18 @@
   <p:clrMapOvr>
     <a:masterClrMapping/>
   </p:clrMapOvr>
-  <p:transition spd="slow" advClick="0" advTm="1000">
-    <p:fade/>
-  </p:transition>
+  <mc:AlternateContent xmlns:mc="http://schemas.openxmlformats.org/markup-compatibility/2006">
+    <mc:Choice xmlns:p14="http://schemas.microsoft.com/office/powerpoint/2010/main" Requires="p14">
+      <p:transition p14:dur="250" advClick="0" advTm="500">
+        <p:fade/>
+      </p:transition>
+    </mc:Choice>
+    <mc:Fallback>
+      <p:transition advClick="0" advTm="500">
+        <p:fade/>
+      </p:transition>
+    </mc:Fallback>
+  </mc:AlternateContent>
 </p:sld>
 </file>
 
@@ -15588,9 +15777,18 @@
   <p:clrMapOvr>
     <a:masterClrMapping/>
   </p:clrMapOvr>
-  <p:transition spd="slow" advClick="0" advTm="1000">
-    <p:fade/>
-  </p:transition>
+  <mc:AlternateContent xmlns:mc="http://schemas.openxmlformats.org/markup-compatibility/2006">
+    <mc:Choice xmlns:p14="http://schemas.microsoft.com/office/powerpoint/2010/main" Requires="p14">
+      <p:transition p14:dur="250" advClick="0" advTm="500">
+        <p:fade/>
+      </p:transition>
+    </mc:Choice>
+    <mc:Fallback>
+      <p:transition advClick="0" advTm="500">
+        <p:fade/>
+      </p:transition>
+    </mc:Fallback>
+  </mc:AlternateContent>
 </p:sld>
 </file>
 
@@ -16172,9 +16370,18 @@
   <p:clrMapOvr>
     <a:masterClrMapping/>
   </p:clrMapOvr>
-  <p:transition spd="slow" advClick="0" advTm="1000">
-    <p:fade/>
-  </p:transition>
+  <mc:AlternateContent xmlns:mc="http://schemas.openxmlformats.org/markup-compatibility/2006">
+    <mc:Choice xmlns:p14="http://schemas.microsoft.com/office/powerpoint/2010/main" Requires="p14">
+      <p:transition p14:dur="250" advClick="0" advTm="500">
+        <p:fade/>
+      </p:transition>
+    </mc:Choice>
+    <mc:Fallback>
+      <p:transition advClick="0" advTm="500">
+        <p:fade/>
+      </p:transition>
+    </mc:Fallback>
+  </mc:AlternateContent>
 </p:sld>
 </file>
 
@@ -16756,9 +16963,18 @@
   <p:clrMapOvr>
     <a:masterClrMapping/>
   </p:clrMapOvr>
-  <p:transition spd="slow" advClick="0" advTm="1000">
-    <p:fade/>
-  </p:transition>
+  <mc:AlternateContent xmlns:mc="http://schemas.openxmlformats.org/markup-compatibility/2006">
+    <mc:Choice xmlns:p14="http://schemas.microsoft.com/office/powerpoint/2010/main" Requires="p14">
+      <p:transition p14:dur="250" advClick="0" advTm="250">
+        <p:fade/>
+      </p:transition>
+    </mc:Choice>
+    <mc:Fallback>
+      <p:transition advClick="0" advTm="250">
+        <p:fade/>
+      </p:transition>
+    </mc:Fallback>
+  </mc:AlternateContent>
 </p:sld>
 </file>
 

</xml_diff>